<commit_message>
Aktualizacja dokumentacji + poprawinie numeracji
</commit_message>
<xml_diff>
--- a/przentacja.pptx
+++ b/przentacja.pptx
@@ -408,7 +408,7 @@
           <a:p>
             <a:fld id="{78ABE3C1-DBE1-495D-B57B-2849774B866A}" type="datetimeFigureOut">
               <a:rPr lang="en-US" dirty="0"/>
-              <a:t>5/17/2020</a:t>
+              <a:t>5/20/2020</a:t>
             </a:fld>
             <a:endParaRPr lang="en-US" dirty="0"/>
           </a:p>
@@ -817,7 +817,7 @@
           <a:p>
             <a:fld id="{446C117F-5CCF-4837-BE5F-2B92066CAFAF}" type="datetimeFigureOut">
               <a:rPr lang="en-US" dirty="0"/>
-              <a:t>5/17/2020</a:t>
+              <a:t>5/20/2020</a:t>
             </a:fld>
             <a:endParaRPr lang="en-US" dirty="0"/>
           </a:p>
@@ -1148,7 +1148,7 @@
           <a:p>
             <a:fld id="{84EB90BD-B6CE-46B7-997F-7313B992CCDC}" type="datetimeFigureOut">
               <a:rPr lang="en-US" dirty="0"/>
-              <a:t>5/17/2020</a:t>
+              <a:t>5/20/2020</a:t>
             </a:fld>
             <a:endParaRPr lang="en-US" dirty="0"/>
           </a:p>
@@ -1548,7 +1548,7 @@
           <a:p>
             <a:fld id="{CDB9D11F-B188-461D-B23F-39381795C052}" type="datetimeFigureOut">
               <a:rPr lang="en-US" dirty="0"/>
-              <a:t>5/17/2020</a:t>
+              <a:t>5/20/2020</a:t>
             </a:fld>
             <a:endParaRPr lang="en-US" dirty="0"/>
           </a:p>
@@ -2111,7 +2111,7 @@
           <a:p>
             <a:fld id="{52E6D8D9-55A2-4063-B0F3-121F44549695}" type="datetimeFigureOut">
               <a:rPr lang="en-US" dirty="0"/>
-              <a:t>5/17/2020</a:t>
+              <a:t>5/20/2020</a:t>
             </a:fld>
             <a:endParaRPr lang="en-US" dirty="0"/>
           </a:p>
@@ -2787,7 +2787,7 @@
           <a:p>
             <a:fld id="{D4B24536-994D-4021-A283-9F449C0DB509}" type="datetimeFigureOut">
               <a:rPr lang="en-US" dirty="0"/>
-              <a:t>5/17/2020</a:t>
+              <a:t>5/20/2020</a:t>
             </a:fld>
             <a:endParaRPr lang="en-US" dirty="0"/>
           </a:p>
@@ -3695,7 +3695,7 @@
           <a:p>
             <a:fld id="{3CBBBB78-C96F-47B7-AB17-D852CA960AC9}" type="datetimeFigureOut">
               <a:rPr lang="en-US" dirty="0"/>
-              <a:t>5/17/2020</a:t>
+              <a:t>5/20/2020</a:t>
             </a:fld>
             <a:endParaRPr lang="en-US" dirty="0"/>
           </a:p>
@@ -4003,7 +4003,7 @@
           <a:p>
             <a:fld id="{1FA3F48C-C7C6-4055-9F49-3777875E72AE}" type="datetimeFigureOut">
               <a:rPr lang="en-US" dirty="0"/>
-              <a:t>5/17/2020</a:t>
+              <a:t>5/20/2020</a:t>
             </a:fld>
             <a:endParaRPr lang="en-US" dirty="0"/>
           </a:p>
@@ -4262,7 +4262,7 @@
           <a:p>
             <a:fld id="{6178E61D-D431-422C-9764-11DAFE33AB63}" type="datetimeFigureOut">
               <a:rPr lang="en-US" dirty="0"/>
-              <a:t>5/17/2020</a:t>
+              <a:t>5/20/2020</a:t>
             </a:fld>
             <a:endParaRPr lang="en-US" dirty="0"/>
           </a:p>
@@ -4581,7 +4581,7 @@
           <a:p>
             <a:fld id="{12DE42F4-6EEF-4EF7-8ED4-2208F0F89A08}" type="datetimeFigureOut">
               <a:rPr lang="en-US" dirty="0"/>
-              <a:t>5/17/2020</a:t>
+              <a:t>5/20/2020</a:t>
             </a:fld>
             <a:endParaRPr lang="en-US" dirty="0"/>
           </a:p>
@@ -4965,7 +4965,7 @@
           <a:p>
             <a:fld id="{30578ACC-22D6-47C1-A373-4FD133E34F3C}" type="datetimeFigureOut">
               <a:rPr lang="en-US" dirty="0"/>
-              <a:t>5/17/2020</a:t>
+              <a:t>5/20/2020</a:t>
             </a:fld>
             <a:endParaRPr lang="en-US" dirty="0"/>
           </a:p>
@@ -5336,7 +5336,7 @@
           <a:p>
             <a:fld id="{4E5A6C69-6797-4E8A-BF37-F2C3751466E9}" type="datetimeFigureOut">
               <a:rPr lang="en-US" dirty="0"/>
-              <a:t>5/17/2020</a:t>
+              <a:t>5/20/2020</a:t>
             </a:fld>
             <a:endParaRPr lang="en-US" dirty="0"/>
           </a:p>
@@ -5837,7 +5837,7 @@
           <a:p>
             <a:fld id="{D82014A1-A632-4878-A0D3-F52BA7563730}" type="datetimeFigureOut">
               <a:rPr lang="en-US" dirty="0"/>
-              <a:t>5/17/2020</a:t>
+              <a:t>5/20/2020</a:t>
             </a:fld>
             <a:endParaRPr lang="en-US" dirty="0"/>
           </a:p>
@@ -6089,7 +6089,7 @@
           <a:p>
             <a:fld id="{CE99F462-093F-4566-844B-4C71F2739DA5}" type="datetimeFigureOut">
               <a:rPr lang="en-US" dirty="0"/>
-              <a:t>5/17/2020</a:t>
+              <a:t>5/20/2020</a:t>
             </a:fld>
             <a:endParaRPr lang="en-US" dirty="0"/>
           </a:p>
@@ -6247,7 +6247,7 @@
           <a:p>
             <a:fld id="{3D24A7AC-904D-4781-85BA-7D10C17ED021}" type="datetimeFigureOut">
               <a:rPr lang="en-US" dirty="0"/>
-              <a:t>5/17/2020</a:t>
+              <a:t>5/20/2020</a:t>
             </a:fld>
             <a:endParaRPr lang="en-US" dirty="0"/>
           </a:p>
@@ -6632,7 +6632,7 @@
           <a:p>
             <a:fld id="{E331444B-B92B-4E27-8C94-BB93EAF5CB18}" type="datetimeFigureOut">
               <a:rPr lang="en-US" dirty="0"/>
-              <a:t>5/17/2020</a:t>
+              <a:t>5/20/2020</a:t>
             </a:fld>
             <a:endParaRPr lang="en-US" dirty="0"/>
           </a:p>
@@ -7036,7 +7036,7 @@
           <a:p>
             <a:fld id="{363EFA5E-FA76-400D-B3DC-F0BA90E6D107}" type="datetimeFigureOut">
               <a:rPr lang="en-US" dirty="0"/>
-              <a:t>5/17/2020</a:t>
+              <a:t>5/20/2020</a:t>
             </a:fld>
             <a:endParaRPr lang="en-US" dirty="0"/>
           </a:p>
@@ -7275,7 +7275,7 @@
           <a:p>
             <a:fld id="{9D6E9DEC-419B-4CC5-A080-3B06BD5A8291}" type="datetimeFigureOut">
               <a:rPr lang="en-US" dirty="0"/>
-              <a:t>5/17/2020</a:t>
+              <a:t>5/20/2020</a:t>
             </a:fld>
             <a:endParaRPr lang="en-US" dirty="0"/>
           </a:p>
@@ -9659,63 +9659,107 @@
       </p:sp>
       <p:pic>
         <p:nvPicPr>
-          <p:cNvPr id="5" name="Symbol zastępczy zawartości 4" descr="Obraz zawierający zrzut ekranu&#10;&#10;Opis wygenerowany automatycznie">
+          <p:cNvPr id="6" name="Obraz 5">
             <a:extLst>
               <a:ext uri="{FF2B5EF4-FFF2-40B4-BE49-F238E27FC236}">
-                <a16:creationId xmlns:a16="http://schemas.microsoft.com/office/drawing/2014/main" id="{B871338A-55AA-4187-BC6F-8DEFFA6230E4}"/>
+                <a16:creationId xmlns:a16="http://schemas.microsoft.com/office/drawing/2014/main" id="{50B3C163-43EF-42C9-AAA2-B03E3720FA89}"/>
               </a:ext>
             </a:extLst>
           </p:cNvPr>
-          <p:cNvPicPr>
-            <a:picLocks noGrp="1" noChangeAspect="1"/>
-          </p:cNvPicPr>
-          <p:nvPr>
-            <p:ph idx="1"/>
-          </p:nvPr>
+          <p:cNvPicPr/>
+          <p:nvPr/>
         </p:nvPicPr>
         <p:blipFill>
-          <a:blip r:embed="rId2"/>
+          <a:blip r:embed="rId2" cstate="print">
+            <a:extLst>
+              <a:ext uri="{28A0092B-C50C-407E-A947-70E740481C1C}">
+                <a14:useLocalDpi xmlns:a14="http://schemas.microsoft.com/office/drawing/2010/main" val="0"/>
+              </a:ext>
+            </a:extLst>
+          </a:blip>
+          <a:srcRect/>
           <a:stretch>
             <a:fillRect/>
           </a:stretch>
         </p:blipFill>
-        <p:spPr>
-          <a:xfrm>
-            <a:off x="2315817" y="2227470"/>
-            <a:ext cx="2309041" cy="4173795"/>
-          </a:xfrm>
+        <p:spPr bwMode="auto">
+          <a:xfrm>
+            <a:off x="7493727" y="2227470"/>
+            <a:ext cx="2126523" cy="4333875"/>
+          </a:xfrm>
+          <a:prstGeom prst="rect">
+            <a:avLst/>
+          </a:prstGeom>
+          <a:noFill/>
+          <a:ln>
+            <a:noFill/>
+          </a:ln>
         </p:spPr>
       </p:pic>
       <p:pic>
         <p:nvPicPr>
-          <p:cNvPr id="11" name="Obraz 10" descr="Obraz zawierający zrzut ekranu, rysunek&#10;&#10;Opis wygenerowany automatycznie">
+          <p:cNvPr id="8" name="Obraz 7">
             <a:extLst>
               <a:ext uri="{FF2B5EF4-FFF2-40B4-BE49-F238E27FC236}">
-                <a16:creationId xmlns:a16="http://schemas.microsoft.com/office/drawing/2014/main" id="{EEADE10B-3D27-485C-9AE9-54992B46A89D}"/>
+                <a16:creationId xmlns:a16="http://schemas.microsoft.com/office/drawing/2014/main" id="{6C3C991B-88AA-45E3-915D-2950D71830BE}"/>
               </a:ext>
             </a:extLst>
           </p:cNvPr>
-          <p:cNvPicPr>
-            <a:picLocks noChangeAspect="1"/>
-          </p:cNvPicPr>
+          <p:cNvPicPr/>
           <p:nvPr/>
         </p:nvPicPr>
         <p:blipFill>
-          <a:blip r:embed="rId3"/>
+          <a:blip r:embed="rId2" cstate="print">
+            <a:extLst>
+              <a:ext uri="{28A0092B-C50C-407E-A947-70E740481C1C}">
+                <a14:useLocalDpi xmlns:a14="http://schemas.microsoft.com/office/drawing/2010/main" val="0"/>
+              </a:ext>
+            </a:extLst>
+          </a:blip>
+          <a:srcRect/>
           <a:stretch>
             <a:fillRect/>
           </a:stretch>
         </p:blipFill>
-        <p:spPr>
-          <a:xfrm>
-            <a:off x="7567144" y="2227469"/>
-            <a:ext cx="2264897" cy="4173795"/>
+        <p:spPr bwMode="auto">
+          <a:xfrm>
+            <a:off x="2466975" y="2227470"/>
+            <a:ext cx="2126523" cy="4333875"/>
           </a:xfrm>
           <a:prstGeom prst="rect">
             <a:avLst/>
           </a:prstGeom>
+          <a:noFill/>
+          <a:ln>
+            <a:noFill/>
+          </a:ln>
         </p:spPr>
       </p:pic>
+      <p:sp>
+        <p:nvSpPr>
+          <p:cNvPr id="4" name="Symbol zastępczy zawartości 3">
+            <a:extLst>
+              <a:ext uri="{FF2B5EF4-FFF2-40B4-BE49-F238E27FC236}">
+                <a16:creationId xmlns:a16="http://schemas.microsoft.com/office/drawing/2014/main" id="{AAFABD0E-E886-478E-A5CD-4F3030E556AB}"/>
+              </a:ext>
+            </a:extLst>
+          </p:cNvPr>
+          <p:cNvSpPr>
+            <a:spLocks noGrp="1"/>
+          </p:cNvSpPr>
+          <p:nvPr>
+            <p:ph idx="1"/>
+          </p:nvPr>
+        </p:nvSpPr>
+        <p:spPr/>
+        <p:txBody>
+          <a:bodyPr/>
+          <a:lstStyle/>
+          <a:p>
+            <a:endParaRPr lang="pl-PL" dirty="0"/>
+          </a:p>
+        </p:txBody>
+      </p:sp>
     </p:spTree>
     <p:extLst>
       <p:ext uri="{BB962C8B-B14F-4D97-AF65-F5344CB8AC3E}">

</xml_diff>

<commit_message>
dokumentacja + prezentacja Nikodem
</commit_message>
<xml_diff>
--- a/przentacja.pptx
+++ b/przentacja.pptx
@@ -8,18 +8,19 @@
     <p:sldId id="256" r:id="rId2"/>
     <p:sldId id="257" r:id="rId3"/>
     <p:sldId id="259" r:id="rId4"/>
-    <p:sldId id="260" r:id="rId5"/>
-    <p:sldId id="274" r:id="rId6"/>
-    <p:sldId id="279" r:id="rId7"/>
-    <p:sldId id="280" r:id="rId8"/>
-    <p:sldId id="281" r:id="rId9"/>
-    <p:sldId id="282" r:id="rId10"/>
-    <p:sldId id="283" r:id="rId11"/>
-    <p:sldId id="284" r:id="rId12"/>
-    <p:sldId id="285" r:id="rId13"/>
-    <p:sldId id="271" r:id="rId14"/>
-    <p:sldId id="272" r:id="rId15"/>
-    <p:sldId id="267" r:id="rId16"/>
+    <p:sldId id="286" r:id="rId5"/>
+    <p:sldId id="260" r:id="rId6"/>
+    <p:sldId id="274" r:id="rId7"/>
+    <p:sldId id="279" r:id="rId8"/>
+    <p:sldId id="280" r:id="rId9"/>
+    <p:sldId id="281" r:id="rId10"/>
+    <p:sldId id="282" r:id="rId11"/>
+    <p:sldId id="283" r:id="rId12"/>
+    <p:sldId id="284" r:id="rId13"/>
+    <p:sldId id="285" r:id="rId14"/>
+    <p:sldId id="271" r:id="rId15"/>
+    <p:sldId id="272" r:id="rId16"/>
+    <p:sldId id="267" r:id="rId17"/>
   </p:sldIdLst>
   <p:sldSz cx="12192000" cy="6858000"/>
   <p:notesSz cx="6858000" cy="9144000"/>
@@ -400,7 +401,7 @@
           <a:p>
             <a:fld id="{78ABE3C1-DBE1-495D-B57B-2849774B866A}" type="datetimeFigureOut">
               <a:rPr lang="en-US" dirty="0"/>
-              <a:t>6/2/2020</a:t>
+              <a:t>6/4/2020</a:t>
             </a:fld>
             <a:endParaRPr lang="en-US" dirty="0"/>
           </a:p>
@@ -809,7 +810,7 @@
           <a:p>
             <a:fld id="{446C117F-5CCF-4837-BE5F-2B92066CAFAF}" type="datetimeFigureOut">
               <a:rPr lang="en-US" dirty="0"/>
-              <a:t>6/2/2020</a:t>
+              <a:t>6/4/2020</a:t>
             </a:fld>
             <a:endParaRPr lang="en-US" dirty="0"/>
           </a:p>
@@ -1140,7 +1141,7 @@
           <a:p>
             <a:fld id="{84EB90BD-B6CE-46B7-997F-7313B992CCDC}" type="datetimeFigureOut">
               <a:rPr lang="en-US" dirty="0"/>
-              <a:t>6/2/2020</a:t>
+              <a:t>6/4/2020</a:t>
             </a:fld>
             <a:endParaRPr lang="en-US" dirty="0"/>
           </a:p>
@@ -1540,7 +1541,7 @@
           <a:p>
             <a:fld id="{CDB9D11F-B188-461D-B23F-39381795C052}" type="datetimeFigureOut">
               <a:rPr lang="en-US" dirty="0"/>
-              <a:t>6/2/2020</a:t>
+              <a:t>6/4/2020</a:t>
             </a:fld>
             <a:endParaRPr lang="en-US" dirty="0"/>
           </a:p>
@@ -2103,7 +2104,7 @@
           <a:p>
             <a:fld id="{52E6D8D9-55A2-4063-B0F3-121F44549695}" type="datetimeFigureOut">
               <a:rPr lang="en-US" dirty="0"/>
-              <a:t>6/2/2020</a:t>
+              <a:t>6/4/2020</a:t>
             </a:fld>
             <a:endParaRPr lang="en-US" dirty="0"/>
           </a:p>
@@ -2779,7 +2780,7 @@
           <a:p>
             <a:fld id="{D4B24536-994D-4021-A283-9F449C0DB509}" type="datetimeFigureOut">
               <a:rPr lang="en-US" dirty="0"/>
-              <a:t>6/2/2020</a:t>
+              <a:t>6/4/2020</a:t>
             </a:fld>
             <a:endParaRPr lang="en-US" dirty="0"/>
           </a:p>
@@ -3687,7 +3688,7 @@
           <a:p>
             <a:fld id="{3CBBBB78-C96F-47B7-AB17-D852CA960AC9}" type="datetimeFigureOut">
               <a:rPr lang="en-US" dirty="0"/>
-              <a:t>6/2/2020</a:t>
+              <a:t>6/4/2020</a:t>
             </a:fld>
             <a:endParaRPr lang="en-US" dirty="0"/>
           </a:p>
@@ -3995,7 +3996,7 @@
           <a:p>
             <a:fld id="{1FA3F48C-C7C6-4055-9F49-3777875E72AE}" type="datetimeFigureOut">
               <a:rPr lang="en-US" dirty="0"/>
-              <a:t>6/2/2020</a:t>
+              <a:t>6/4/2020</a:t>
             </a:fld>
             <a:endParaRPr lang="en-US" dirty="0"/>
           </a:p>
@@ -4254,7 +4255,7 @@
           <a:p>
             <a:fld id="{6178E61D-D431-422C-9764-11DAFE33AB63}" type="datetimeFigureOut">
               <a:rPr lang="en-US" dirty="0"/>
-              <a:t>6/2/2020</a:t>
+              <a:t>6/4/2020</a:t>
             </a:fld>
             <a:endParaRPr lang="en-US" dirty="0"/>
           </a:p>
@@ -4573,7 +4574,7 @@
           <a:p>
             <a:fld id="{12DE42F4-6EEF-4EF7-8ED4-2208F0F89A08}" type="datetimeFigureOut">
               <a:rPr lang="en-US" dirty="0"/>
-              <a:t>6/2/2020</a:t>
+              <a:t>6/4/2020</a:t>
             </a:fld>
             <a:endParaRPr lang="en-US" dirty="0"/>
           </a:p>
@@ -4957,7 +4958,7 @@
           <a:p>
             <a:fld id="{30578ACC-22D6-47C1-A373-4FD133E34F3C}" type="datetimeFigureOut">
               <a:rPr lang="en-US" dirty="0"/>
-              <a:t>6/2/2020</a:t>
+              <a:t>6/4/2020</a:t>
             </a:fld>
             <a:endParaRPr lang="en-US" dirty="0"/>
           </a:p>
@@ -5328,7 +5329,7 @@
           <a:p>
             <a:fld id="{4E5A6C69-6797-4E8A-BF37-F2C3751466E9}" type="datetimeFigureOut">
               <a:rPr lang="en-US" dirty="0"/>
-              <a:t>6/2/2020</a:t>
+              <a:t>6/4/2020</a:t>
             </a:fld>
             <a:endParaRPr lang="en-US" dirty="0"/>
           </a:p>
@@ -5829,7 +5830,7 @@
           <a:p>
             <a:fld id="{D82014A1-A632-4878-A0D3-F52BA7563730}" type="datetimeFigureOut">
               <a:rPr lang="en-US" dirty="0"/>
-              <a:t>6/2/2020</a:t>
+              <a:t>6/4/2020</a:t>
             </a:fld>
             <a:endParaRPr lang="en-US" dirty="0"/>
           </a:p>
@@ -6081,7 +6082,7 @@
           <a:p>
             <a:fld id="{CE99F462-093F-4566-844B-4C71F2739DA5}" type="datetimeFigureOut">
               <a:rPr lang="en-US" dirty="0"/>
-              <a:t>6/2/2020</a:t>
+              <a:t>6/4/2020</a:t>
             </a:fld>
             <a:endParaRPr lang="en-US" dirty="0"/>
           </a:p>
@@ -6239,7 +6240,7 @@
           <a:p>
             <a:fld id="{3D24A7AC-904D-4781-85BA-7D10C17ED021}" type="datetimeFigureOut">
               <a:rPr lang="en-US" dirty="0"/>
-              <a:t>6/2/2020</a:t>
+              <a:t>6/4/2020</a:t>
             </a:fld>
             <a:endParaRPr lang="en-US" dirty="0"/>
           </a:p>
@@ -6624,7 +6625,7 @@
           <a:p>
             <a:fld id="{E331444B-B92B-4E27-8C94-BB93EAF5CB18}" type="datetimeFigureOut">
               <a:rPr lang="en-US" dirty="0"/>
-              <a:t>6/2/2020</a:t>
+              <a:t>6/4/2020</a:t>
             </a:fld>
             <a:endParaRPr lang="en-US" dirty="0"/>
           </a:p>
@@ -7028,7 +7029,7 @@
           <a:p>
             <a:fld id="{363EFA5E-FA76-400D-B3DC-F0BA90E6D107}" type="datetimeFigureOut">
               <a:rPr lang="en-US" dirty="0"/>
-              <a:t>6/2/2020</a:t>
+              <a:t>6/4/2020</a:t>
             </a:fld>
             <a:endParaRPr lang="en-US" dirty="0"/>
           </a:p>
@@ -7267,7 +7268,7 @@
           <a:p>
             <a:fld id="{9D6E9DEC-419B-4CC5-A080-3B06BD5A8291}" type="datetimeFigureOut">
               <a:rPr lang="en-US" dirty="0"/>
-              <a:t>6/2/2020</a:t>
+              <a:t>6/4/2020</a:t>
             </a:fld>
             <a:endParaRPr lang="en-US" dirty="0"/>
           </a:p>
@@ -7731,25 +7732,29 @@
         </p:nvSpPr>
         <p:spPr>
           <a:xfrm>
-            <a:off x="779176" y="4385801"/>
-            <a:ext cx="8144134" cy="1117687"/>
-          </a:xfrm>
-        </p:spPr>
-        <p:txBody>
-          <a:bodyPr/>
+            <a:off x="0" y="6149130"/>
+            <a:ext cx="8144134" cy="708870"/>
+          </a:xfrm>
+        </p:spPr>
+        <p:txBody>
+          <a:bodyPr>
+            <a:normAutofit lnSpcReduction="10000"/>
+          </a:bodyPr>
           <a:lstStyle/>
           <a:p>
+            <a:pPr algn="l"/>
             <a:r>
               <a:rPr lang="pl-PL" dirty="0"/>
               <a:t>Projekt zgłoszony przez firmę </a:t>
             </a:r>
             <a:r>
               <a:rPr lang="pl-PL" dirty="0" err="1"/>
-              <a:t>InterElecom</a:t>
+              <a:t>InterElcom</a:t>
             </a:r>
             <a:endParaRPr lang="pl-PL" dirty="0"/>
           </a:p>
           <a:p>
+            <a:pPr algn="l"/>
             <a:r>
               <a:rPr lang="pl-PL" dirty="0"/>
               <a:t>Prowadzący: Dr inż. Jan Nikodem</a:t>
@@ -7832,6 +7837,143 @@
           </a:prstGeom>
         </p:spPr>
       </p:pic>
+      <p:sp>
+        <p:nvSpPr>
+          <p:cNvPr id="4" name="pole tekstowe 3">
+            <a:extLst>
+              <a:ext uri="{FF2B5EF4-FFF2-40B4-BE49-F238E27FC236}">
+                <a16:creationId xmlns:a16="http://schemas.microsoft.com/office/drawing/2014/main" id="{1088FBA3-0DDB-4A12-9611-4DDA8911933C}"/>
+              </a:ext>
+            </a:extLst>
+          </p:cNvPr>
+          <p:cNvSpPr txBox="1"/>
+          <p:nvPr/>
+        </p:nvSpPr>
+        <p:spPr>
+          <a:xfrm>
+            <a:off x="9088073" y="4983061"/>
+            <a:ext cx="3103927" cy="1754326"/>
+          </a:xfrm>
+          <a:prstGeom prst="rect">
+            <a:avLst/>
+          </a:prstGeom>
+          <a:noFill/>
+        </p:spPr>
+        <p:txBody>
+          <a:bodyPr wrap="square" rtlCol="0">
+            <a:spAutoFit/>
+          </a:bodyPr>
+          <a:lstStyle/>
+          <a:p>
+            <a:r>
+              <a:rPr lang="pl-PL" dirty="0"/>
+              <a:t>Grupa:</a:t>
+            </a:r>
+          </a:p>
+          <a:p>
+            <a:pPr marL="285750" indent="-285750">
+              <a:buFont typeface="Arial" panose="020B0604020202020204" pitchFamily="34" charset="0"/>
+              <a:buChar char="•"/>
+            </a:pPr>
+            <a:r>
+              <a:rPr lang="pl-PL" dirty="0"/>
+              <a:t>Adam Krizar</a:t>
+            </a:r>
+          </a:p>
+          <a:p>
+            <a:pPr marL="285750" indent="-285750">
+              <a:buFont typeface="Arial" panose="020B0604020202020204" pitchFamily="34" charset="0"/>
+              <a:buChar char="•"/>
+            </a:pPr>
+            <a:r>
+              <a:rPr lang="pl-PL" dirty="0"/>
+              <a:t>Arkadiusz Cichy</a:t>
+            </a:r>
+          </a:p>
+          <a:p>
+            <a:pPr marL="285750" indent="-285750">
+              <a:buFont typeface="Arial" panose="020B0604020202020204" pitchFamily="34" charset="0"/>
+              <a:buChar char="•"/>
+            </a:pPr>
+            <a:r>
+              <a:rPr lang="pl-PL" dirty="0"/>
+              <a:t>Katarzyna Czajkowska </a:t>
+            </a:r>
+          </a:p>
+          <a:p>
+            <a:pPr marL="285750" indent="-285750">
+              <a:buFont typeface="Arial" panose="020B0604020202020204" pitchFamily="34" charset="0"/>
+              <a:buChar char="•"/>
+            </a:pPr>
+            <a:r>
+              <a:rPr lang="pl-PL" dirty="0"/>
+              <a:t>Mateusz </a:t>
+            </a:r>
+            <a:r>
+              <a:rPr lang="pl-PL" dirty="0" err="1"/>
+              <a:t>Gurski</a:t>
+            </a:r>
+            <a:endParaRPr lang="pl-PL" dirty="0"/>
+          </a:p>
+          <a:p>
+            <a:pPr marL="285750" indent="-285750">
+              <a:buFont typeface="Arial" panose="020B0604020202020204" pitchFamily="34" charset="0"/>
+              <a:buChar char="•"/>
+            </a:pPr>
+            <a:r>
+              <a:rPr lang="pl-PL" dirty="0"/>
+              <a:t>Szymon Cichy</a:t>
+            </a:r>
+          </a:p>
+        </p:txBody>
+      </p:sp>
+      <p:sp>
+        <p:nvSpPr>
+          <p:cNvPr id="6" name="pole tekstowe 5">
+            <a:extLst>
+              <a:ext uri="{FF2B5EF4-FFF2-40B4-BE49-F238E27FC236}">
+                <a16:creationId xmlns:a16="http://schemas.microsoft.com/office/drawing/2014/main" id="{E4098600-F94D-4083-8C2B-22B1CA5636FB}"/>
+              </a:ext>
+            </a:extLst>
+          </p:cNvPr>
+          <p:cNvSpPr txBox="1"/>
+          <p:nvPr/>
+        </p:nvSpPr>
+        <p:spPr>
+          <a:xfrm>
+            <a:off x="9088073" y="2658070"/>
+            <a:ext cx="2869035" cy="923330"/>
+          </a:xfrm>
+          <a:prstGeom prst="rect">
+            <a:avLst/>
+          </a:prstGeom>
+          <a:noFill/>
+        </p:spPr>
+        <p:txBody>
+          <a:bodyPr wrap="square" rtlCol="0">
+            <a:spAutoFit/>
+          </a:bodyPr>
+          <a:lstStyle/>
+          <a:p>
+            <a:r>
+              <a:rPr lang="pl-PL" dirty="0"/>
+              <a:t>Wydział: Elektronika</a:t>
+            </a:r>
+          </a:p>
+          <a:p>
+            <a:r>
+              <a:rPr lang="pl-PL" dirty="0"/>
+              <a:t>Kierunek: Informatyka</a:t>
+            </a:r>
+          </a:p>
+          <a:p>
+            <a:r>
+              <a:rPr lang="pl-PL" dirty="0"/>
+              <a:t>Projekt zespołowy</a:t>
+            </a:r>
+          </a:p>
+        </p:txBody>
+      </p:sp>
     </p:spTree>
     <p:extLst>
       <p:ext uri="{BB962C8B-B14F-4D97-AF65-F5344CB8AC3E}">
@@ -8208,10 +8350,10 @@
       </p:sp>
       <p:pic>
         <p:nvPicPr>
-          <p:cNvPr id="5" name="Symbol zastępczy zawartości 4" descr="Obraz zawierający zrzut ekranu&#10;&#10;Opis wygenerowany automatycznie">
+          <p:cNvPr id="5" name="Symbol zastępczy zawartości 4" descr="Obraz zawierający zrzut ekranu, zegar&#10;&#10;Opis wygenerowany automatycznie">
             <a:extLst>
               <a:ext uri="{FF2B5EF4-FFF2-40B4-BE49-F238E27FC236}">
-                <a16:creationId xmlns:a16="http://schemas.microsoft.com/office/drawing/2014/main" id="{EE4DCDC3-42C3-49EB-B85E-F14E660E130A}"/>
+                <a16:creationId xmlns:a16="http://schemas.microsoft.com/office/drawing/2014/main" id="{1F078DD3-E0CD-4B38-8AD4-A0734B9DCC76}"/>
               </a:ext>
             </a:extLst>
           </p:cNvPr>
@@ -8235,10 +8377,45 @@
           </a:xfrm>
         </p:spPr>
       </p:pic>
+      <p:sp>
+        <p:nvSpPr>
+          <p:cNvPr id="9" name="pole tekstowe 8">
+            <a:extLst>
+              <a:ext uri="{FF2B5EF4-FFF2-40B4-BE49-F238E27FC236}">
+                <a16:creationId xmlns:a16="http://schemas.microsoft.com/office/drawing/2014/main" id="{0E1BFBBC-32CD-4B22-AB61-0CC554DF32B5}"/>
+              </a:ext>
+            </a:extLst>
+          </p:cNvPr>
+          <p:cNvSpPr txBox="1"/>
+          <p:nvPr/>
+        </p:nvSpPr>
+        <p:spPr>
+          <a:xfrm>
+            <a:off x="11367083" y="6488668"/>
+            <a:ext cx="860305" cy="369332"/>
+          </a:xfrm>
+          <a:prstGeom prst="rect">
+            <a:avLst/>
+          </a:prstGeom>
+          <a:noFill/>
+        </p:spPr>
+        <p:txBody>
+          <a:bodyPr wrap="square" rtlCol="0">
+            <a:spAutoFit/>
+          </a:bodyPr>
+          <a:lstStyle/>
+          <a:p>
+            <a:r>
+              <a:rPr lang="pl-PL" dirty="0"/>
+              <a:t>10/16</a:t>
+            </a:r>
+          </a:p>
+        </p:txBody>
+      </p:sp>
     </p:spTree>
     <p:extLst>
       <p:ext uri="{BB962C8B-B14F-4D97-AF65-F5344CB8AC3E}">
-        <p14:creationId xmlns:p14="http://schemas.microsoft.com/office/powerpoint/2010/main" val="1948458012"/>
+        <p14:creationId xmlns:p14="http://schemas.microsoft.com/office/powerpoint/2010/main" val="2795247331"/>
       </p:ext>
     </p:extLst>
   </p:cSld>
@@ -8611,10 +8788,10 @@
       </p:sp>
       <p:pic>
         <p:nvPicPr>
-          <p:cNvPr id="5" name="Symbol zastępczy zawartości 4" descr="Obraz zawierający zrzut ekranu, rysunek, mikrofalówka&#10;&#10;Opis wygenerowany automatycznie">
+          <p:cNvPr id="5" name="Symbol zastępczy zawartości 4" descr="Obraz zawierający zrzut ekranu&#10;&#10;Opis wygenerowany automatycznie">
             <a:extLst>
               <a:ext uri="{FF2B5EF4-FFF2-40B4-BE49-F238E27FC236}">
-                <a16:creationId xmlns:a16="http://schemas.microsoft.com/office/drawing/2014/main" id="{95F17CB6-6783-4C52-B754-5F7F9CF403B4}"/>
+                <a16:creationId xmlns:a16="http://schemas.microsoft.com/office/drawing/2014/main" id="{EE4DCDC3-42C3-49EB-B85E-F14E660E130A}"/>
               </a:ext>
             </a:extLst>
           </p:cNvPr>
@@ -8633,15 +8810,50 @@
         </p:blipFill>
         <p:spPr>
           <a:xfrm>
-            <a:off x="6835991" y="-10367"/>
-            <a:ext cx="3170015" cy="6868367"/>
+            <a:off x="6838384" y="0"/>
+            <a:ext cx="3165230" cy="6858000"/>
           </a:xfrm>
         </p:spPr>
       </p:pic>
+      <p:sp>
+        <p:nvSpPr>
+          <p:cNvPr id="9" name="pole tekstowe 8">
+            <a:extLst>
+              <a:ext uri="{FF2B5EF4-FFF2-40B4-BE49-F238E27FC236}">
+                <a16:creationId xmlns:a16="http://schemas.microsoft.com/office/drawing/2014/main" id="{314D116A-1CB5-4429-92DF-38606077B1E1}"/>
+              </a:ext>
+            </a:extLst>
+          </p:cNvPr>
+          <p:cNvSpPr txBox="1"/>
+          <p:nvPr/>
+        </p:nvSpPr>
+        <p:spPr>
+          <a:xfrm>
+            <a:off x="11367083" y="6488668"/>
+            <a:ext cx="860305" cy="369332"/>
+          </a:xfrm>
+          <a:prstGeom prst="rect">
+            <a:avLst/>
+          </a:prstGeom>
+          <a:noFill/>
+        </p:spPr>
+        <p:txBody>
+          <a:bodyPr wrap="square" rtlCol="0">
+            <a:spAutoFit/>
+          </a:bodyPr>
+          <a:lstStyle/>
+          <a:p>
+            <a:r>
+              <a:rPr lang="pl-PL" dirty="0"/>
+              <a:t>11/16</a:t>
+            </a:r>
+          </a:p>
+        </p:txBody>
+      </p:sp>
     </p:spTree>
     <p:extLst>
       <p:ext uri="{BB962C8B-B14F-4D97-AF65-F5344CB8AC3E}">
-        <p14:creationId xmlns:p14="http://schemas.microsoft.com/office/powerpoint/2010/main" val="3668903003"/>
+        <p14:creationId xmlns:p14="http://schemas.microsoft.com/office/powerpoint/2010/main" val="1948458012"/>
       </p:ext>
     </p:extLst>
   </p:cSld>
@@ -9014,10 +9226,10 @@
       </p:sp>
       <p:pic>
         <p:nvPicPr>
-          <p:cNvPr id="5" name="Symbol zastępczy zawartości 4" descr="Obraz zawierający zrzut ekranu, rysunek&#10;&#10;Opis wygenerowany automatycznie">
+          <p:cNvPr id="5" name="Symbol zastępczy zawartości 4" descr="Obraz zawierający zrzut ekranu, rysunek, mikrofalówka&#10;&#10;Opis wygenerowany automatycznie">
             <a:extLst>
               <a:ext uri="{FF2B5EF4-FFF2-40B4-BE49-F238E27FC236}">
-                <a16:creationId xmlns:a16="http://schemas.microsoft.com/office/drawing/2014/main" id="{CE942DEC-B810-4C4D-817B-F9938F0BBBC9}"/>
+                <a16:creationId xmlns:a16="http://schemas.microsoft.com/office/drawing/2014/main" id="{95F17CB6-6783-4C52-B754-5F7F9CF403B4}"/>
               </a:ext>
             </a:extLst>
           </p:cNvPr>
@@ -9036,15 +9248,50 @@
         </p:blipFill>
         <p:spPr>
           <a:xfrm>
-            <a:off x="6838029" y="0"/>
-            <a:ext cx="3165940" cy="6859538"/>
+            <a:off x="6835991" y="-10367"/>
+            <a:ext cx="3170015" cy="6868367"/>
           </a:xfrm>
         </p:spPr>
       </p:pic>
+      <p:sp>
+        <p:nvSpPr>
+          <p:cNvPr id="9" name="pole tekstowe 8">
+            <a:extLst>
+              <a:ext uri="{FF2B5EF4-FFF2-40B4-BE49-F238E27FC236}">
+                <a16:creationId xmlns:a16="http://schemas.microsoft.com/office/drawing/2014/main" id="{35FB483C-DD0C-4E46-AE0F-FE9CBC57AA46}"/>
+              </a:ext>
+            </a:extLst>
+          </p:cNvPr>
+          <p:cNvSpPr txBox="1"/>
+          <p:nvPr/>
+        </p:nvSpPr>
+        <p:spPr>
+          <a:xfrm>
+            <a:off x="11367083" y="6488668"/>
+            <a:ext cx="860305" cy="369332"/>
+          </a:xfrm>
+          <a:prstGeom prst="rect">
+            <a:avLst/>
+          </a:prstGeom>
+          <a:noFill/>
+        </p:spPr>
+        <p:txBody>
+          <a:bodyPr wrap="square" rtlCol="0">
+            <a:spAutoFit/>
+          </a:bodyPr>
+          <a:lstStyle/>
+          <a:p>
+            <a:r>
+              <a:rPr lang="pl-PL" dirty="0"/>
+              <a:t>12/16</a:t>
+            </a:r>
+          </a:p>
+        </p:txBody>
+      </p:sp>
     </p:spTree>
     <p:extLst>
       <p:ext uri="{BB962C8B-B14F-4D97-AF65-F5344CB8AC3E}">
-        <p14:creationId xmlns:p14="http://schemas.microsoft.com/office/powerpoint/2010/main" val="2802582942"/>
+        <p14:creationId xmlns:p14="http://schemas.microsoft.com/office/powerpoint/2010/main" val="3668903003"/>
       </p:ext>
     </p:extLst>
   </p:cSld>
@@ -9057,6 +9304,41 @@
 <file path=ppt/slides/slide13.xml><?xml version="1.0" encoding="utf-8"?>
 <p:sld xmlns:a="http://schemas.openxmlformats.org/drawingml/2006/main" xmlns:r="http://schemas.openxmlformats.org/officeDocument/2006/relationships" xmlns:p="http://schemas.openxmlformats.org/presentationml/2006/main">
   <p:cSld>
+    <p:bg>
+      <p:bgPr>
+        <a:gradFill rotWithShape="1">
+          <a:gsLst>
+            <a:gs pos="0">
+              <a:schemeClr val="bg2">
+                <a:tint val="96000"/>
+                <a:shade val="100000"/>
+                <a:hueMod val="270000"/>
+                <a:satMod val="200000"/>
+                <a:lumMod val="128000"/>
+              </a:schemeClr>
+            </a:gs>
+            <a:gs pos="50000">
+              <a:schemeClr val="bg2">
+                <a:shade val="100000"/>
+                <a:hueMod val="100000"/>
+                <a:satMod val="110000"/>
+                <a:lumMod val="130000"/>
+              </a:schemeClr>
+            </a:gs>
+            <a:gs pos="100000">
+              <a:schemeClr val="bg2">
+                <a:shade val="78000"/>
+                <a:hueMod val="44000"/>
+                <a:satMod val="200000"/>
+                <a:lumMod val="69000"/>
+              </a:schemeClr>
+            </a:gs>
+          </a:gsLst>
+          <a:lin ang="2520000" scaled="0"/>
+        </a:gradFill>
+        <a:effectLst/>
+      </p:bgPr>
+    </p:bg>
     <p:spTree>
       <p:nvGrpSpPr>
         <p:cNvPr id="1" name=""/>
@@ -9071,219 +9353,106 @@
           <a:chExt cx="0" cy="0"/>
         </a:xfrm>
       </p:grpSpPr>
-      <p:sp>
-        <p:nvSpPr>
-          <p:cNvPr id="2" name="Tytuł 1">
+      <p:sp useBgFill="1">
+        <p:nvSpPr>
+          <p:cNvPr id="8" name="Rectangle 7">
             <a:extLst>
               <a:ext uri="{FF2B5EF4-FFF2-40B4-BE49-F238E27FC236}">
-                <a16:creationId xmlns:a16="http://schemas.microsoft.com/office/drawing/2014/main" id="{84776CD2-899A-4263-BB7E-C0065E69C8CB}"/>
+                <a16:creationId xmlns:a16="http://schemas.microsoft.com/office/drawing/2014/main" id="{4B0FA309-807F-4C17-98EF-A3BA7388E213}"/>
+              </a:ext>
+              <a:ext uri="{C183D7F6-B498-43B3-948B-1728B52AA6E4}">
+                <adec:decorative xmlns:adec="http://schemas.microsoft.com/office/drawing/2017/decorative" val="1"/>
               </a:ext>
             </a:extLst>
           </p:cNvPr>
           <p:cNvSpPr>
-            <a:spLocks noGrp="1"/>
-          </p:cNvSpPr>
-          <p:nvPr>
-            <p:ph type="title"/>
-          </p:nvPr>
-        </p:nvSpPr>
-        <p:spPr/>
-        <p:txBody>
-          <a:bodyPr/>
+            <a:spLocks noGrp="1" noRot="1" noChangeAspect="1" noMove="1" noResize="1" noEditPoints="1" noAdjustHandles="1" noChangeArrowheads="1" noChangeShapeType="1" noTextEdit="1"/>
+          </p:cNvSpPr>
+          <p:nvPr>
+            <p:extLst>
+              <p:ext uri="{386F3935-93C4-4BCD-93E2-E3B085C9AB24}">
+                <p16:designElem xmlns:p16="http://schemas.microsoft.com/office/powerpoint/2015/main" val="1"/>
+              </p:ext>
+            </p:extLst>
+          </p:nvPr>
+        </p:nvSpPr>
+        <p:spPr>
+          <a:xfrm>
+            <a:off x="0" y="0"/>
+            <a:ext cx="12188824" cy="6858000"/>
+          </a:xfrm>
+          <a:prstGeom prst="rect">
+            <a:avLst/>
+          </a:prstGeom>
+          <a:ln>
+            <a:noFill/>
+          </a:ln>
+        </p:spPr>
+        <p:style>
+          <a:lnRef idx="2">
+            <a:schemeClr val="accent1">
+              <a:shade val="50000"/>
+            </a:schemeClr>
+          </a:lnRef>
+          <a:fillRef idx="1">
+            <a:schemeClr val="accent1"/>
+          </a:fillRef>
+          <a:effectRef idx="0">
+            <a:schemeClr val="accent1"/>
+          </a:effectRef>
+          <a:fontRef idx="minor">
+            <a:schemeClr val="lt1"/>
+          </a:fontRef>
+        </p:style>
+        <p:txBody>
+          <a:bodyPr rtlCol="0" anchor="ctr"/>
           <a:lstStyle/>
           <a:p>
-            <a:r>
-              <a:rPr lang="pl-PL" dirty="0"/>
-              <a:t>Przykładowe </a:t>
-            </a:r>
-            <a:r>
-              <a:rPr lang="pl-PL" dirty="0" err="1"/>
-              <a:t>IoT</a:t>
-            </a:r>
-            <a:r>
-              <a:rPr lang="pl-PL" dirty="0"/>
-              <a:t> - Mikrokontroler</a:t>
-            </a:r>
-          </a:p>
-        </p:txBody>
-      </p:sp>
-      <p:sp>
-        <p:nvSpPr>
-          <p:cNvPr id="3" name="Symbol zastępczy zawartości 2">
-            <a:extLst>
-              <a:ext uri="{FF2B5EF4-FFF2-40B4-BE49-F238E27FC236}">
-                <a16:creationId xmlns:a16="http://schemas.microsoft.com/office/drawing/2014/main" id="{38A094A9-3A96-4045-BAAE-DE674BA25A76}"/>
-              </a:ext>
-            </a:extLst>
-          </p:cNvPr>
-          <p:cNvSpPr>
-            <a:spLocks noGrp="1"/>
-          </p:cNvSpPr>
-          <p:nvPr>
-            <p:ph idx="1"/>
-          </p:nvPr>
-        </p:nvSpPr>
-        <p:spPr>
-          <a:xfrm>
-            <a:off x="0" y="2367649"/>
-            <a:ext cx="3531765" cy="4226097"/>
-          </a:xfrm>
-        </p:spPr>
-        <p:txBody>
-          <a:bodyPr>
-            <a:normAutofit fontScale="62500" lnSpcReduction="20000"/>
-          </a:bodyPr>
-          <a:lstStyle/>
-          <a:p>
-            <a:pPr lvl="0"/>
-            <a:r>
-              <a:rPr lang="pl-PL" sz="2900" b="1" dirty="0"/>
-              <a:t>Komunikacja </a:t>
-            </a:r>
-            <a:r>
-              <a:rPr lang="pl-PL" sz="2900" b="1" dirty="0" err="1"/>
-              <a:t>WiFi</a:t>
-            </a:r>
-            <a:r>
-              <a:rPr lang="pl-PL" sz="2900" b="1" dirty="0"/>
-              <a:t>:</a:t>
-            </a:r>
-            <a:endParaRPr lang="pl-PL" sz="2900" dirty="0"/>
-          </a:p>
-          <a:p>
-            <a:pPr marL="0" indent="0">
-              <a:buNone/>
-            </a:pPr>
-            <a:r>
-              <a:rPr lang="pl-PL" sz="2900" dirty="0"/>
-              <a:t>- standard 802.11 b/g/n 2,4 GHz,</a:t>
-            </a:r>
-            <a:br>
-              <a:rPr lang="pl-PL" sz="2900" dirty="0"/>
-            </a:br>
-            <a:r>
-              <a:rPr lang="pl-PL" sz="2900" dirty="0"/>
-              <a:t>- prędkość transmisji do 72,2 </a:t>
-            </a:r>
-            <a:r>
-              <a:rPr lang="pl-PL" sz="2900" dirty="0" err="1"/>
-              <a:t>Mb</a:t>
-            </a:r>
-            <a:r>
-              <a:rPr lang="pl-PL" sz="2900" dirty="0"/>
-              <a:t>/s,</a:t>
-            </a:r>
-            <a:br>
-              <a:rPr lang="pl-PL" sz="2900" dirty="0"/>
-            </a:br>
-            <a:r>
-              <a:rPr lang="pl-PL" sz="2900" dirty="0"/>
-              <a:t>- zabezpieczenia: WPA/WPA2,</a:t>
-            </a:r>
-            <a:br>
-              <a:rPr lang="pl-PL" sz="2900" dirty="0"/>
-            </a:br>
-            <a:r>
-              <a:rPr lang="pl-PL" sz="2900" dirty="0"/>
-              <a:t>- szyfrowanie: WEP/TKIP/AES,</a:t>
-            </a:r>
-            <a:br>
-              <a:rPr lang="pl-PL" sz="2900" dirty="0"/>
-            </a:br>
-            <a:r>
-              <a:rPr lang="pl-PL" sz="2900" dirty="0"/>
-              <a:t>- protokoły: IPv4, TCP/UDP/HTTP.</a:t>
-            </a:r>
-          </a:p>
-          <a:p>
-            <a:pPr lvl="0"/>
-            <a:r>
-              <a:rPr lang="pl-PL" sz="2900" b="1" dirty="0"/>
-              <a:t>Zasilanie</a:t>
-            </a:r>
-            <a:r>
-              <a:rPr lang="pl-PL" sz="2900" dirty="0"/>
-              <a:t>:</a:t>
-            </a:r>
-          </a:p>
-          <a:p>
-            <a:pPr marL="0" indent="0">
-              <a:buNone/>
-            </a:pPr>
-            <a:r>
-              <a:rPr lang="pl-PL" sz="2900" dirty="0"/>
-              <a:t>- napięcie pracy: 2,5 – 3,6 V,</a:t>
-            </a:r>
-            <a:br>
-              <a:rPr lang="pl-PL" sz="2900" dirty="0"/>
-            </a:br>
-            <a:r>
-              <a:rPr lang="pl-PL" sz="2900" dirty="0"/>
-              <a:t>- napięcie zasilania: 4,8 – 12 V,</a:t>
-            </a:r>
-            <a:br>
-              <a:rPr lang="pl-PL" sz="2900" dirty="0"/>
-            </a:br>
-            <a:r>
-              <a:rPr lang="pl-PL" sz="2900" dirty="0"/>
-              <a:t>- średni pobór prądu: 80 </a:t>
-            </a:r>
-            <a:r>
-              <a:rPr lang="pl-PL" sz="2900" dirty="0" err="1"/>
-              <a:t>mA</a:t>
-            </a:r>
-            <a:r>
-              <a:rPr lang="pl-PL" sz="2900" dirty="0"/>
-              <a:t>,</a:t>
-            </a:r>
-            <a:br>
-              <a:rPr lang="pl-PL" sz="2900" dirty="0"/>
-            </a:br>
-            <a:r>
-              <a:rPr lang="pl-PL" sz="2900" dirty="0"/>
-              <a:t>- maksymalny pobór prądu: 800 </a:t>
-            </a:r>
-            <a:r>
-              <a:rPr lang="pl-PL" sz="2900" dirty="0" err="1"/>
-              <a:t>mA</a:t>
-            </a:r>
-            <a:r>
-              <a:rPr lang="pl-PL" sz="2900" dirty="0"/>
-              <a:t>.</a:t>
-            </a:r>
-          </a:p>
-          <a:p>
-            <a:pPr marL="0" indent="0">
-              <a:buNone/>
-            </a:pPr>
-            <a:endParaRPr lang="pl-PL" dirty="0"/>
+            <a:pPr algn="ctr"/>
+            <a:endParaRPr lang="en-US"/>
           </a:p>
         </p:txBody>
       </p:sp>
       <p:pic>
         <p:nvPicPr>
-          <p:cNvPr id="4" name="Symbol zastępczy zawartości 3">
+          <p:cNvPr id="10" name="Picture 9">
             <a:extLst>
               <a:ext uri="{FF2B5EF4-FFF2-40B4-BE49-F238E27FC236}">
-                <a16:creationId xmlns:a16="http://schemas.microsoft.com/office/drawing/2014/main" id="{6FA39A1F-7AC8-4C9D-BC86-C98F3371FA4B}"/>
+                <a16:creationId xmlns:a16="http://schemas.microsoft.com/office/drawing/2014/main" id="{2642A87B-CAE9-4F8F-B293-28388E45D9EE}"/>
+              </a:ext>
+              <a:ext uri="{C183D7F6-B498-43B3-948B-1728B52AA6E4}">
+                <adec:decorative xmlns:adec="http://schemas.microsoft.com/office/drawing/2017/decorative" val="1"/>
               </a:ext>
             </a:extLst>
           </p:cNvPr>
           <p:cNvPicPr>
-            <a:picLocks noChangeAspect="1"/>
+            <a:picLocks noGrp="1" noRot="1" noChangeAspect="1" noMove="1" noResize="1" noEditPoints="1" noAdjustHandles="1" noChangeArrowheads="1" noChangeShapeType="1" noCrop="1"/>
           </p:cNvPicPr>
-          <p:nvPr/>
+          <p:nvPr>
+            <p:extLst>
+              <p:ext uri="{386F3935-93C4-4BCD-93E2-E3B085C9AB24}">
+                <p16:designElem xmlns:p16="http://schemas.microsoft.com/office/powerpoint/2015/main" val="1"/>
+              </p:ext>
+            </p:extLst>
+          </p:nvPr>
         </p:nvPicPr>
         <p:blipFill>
-          <a:blip r:embed="rId2"/>
+          <a:blip r:embed="rId2">
+            <a:alphaModFix amt="10000"/>
+            <a:extLst>
+              <a:ext uri="{28A0092B-C50C-407E-A947-70E740481C1C}">
+                <a14:useLocalDpi xmlns:a14="http://schemas.microsoft.com/office/drawing/2010/main" val="0"/>
+              </a:ext>
+            </a:extLst>
+          </a:blip>
           <a:stretch>
             <a:fillRect/>
           </a:stretch>
         </p:blipFill>
         <p:spPr>
           <a:xfrm>
-            <a:off x="7862170" y="2733060"/>
-            <a:ext cx="3821873" cy="2756608"/>
+            <a:off x="0" y="0"/>
+            <a:ext cx="12192000" cy="6858000"/>
           </a:xfrm>
           <a:prstGeom prst="rect">
             <a:avLst/>
@@ -9292,10 +9461,242 @@
       </p:pic>
       <p:sp>
         <p:nvSpPr>
-          <p:cNvPr id="5" name="pole tekstowe 4">
+          <p:cNvPr id="12" name="Rectangle 11">
             <a:extLst>
               <a:ext uri="{FF2B5EF4-FFF2-40B4-BE49-F238E27FC236}">
-                <a16:creationId xmlns:a16="http://schemas.microsoft.com/office/drawing/2014/main" id="{68D0C849-E0DE-45B0-818D-74E9C197FDD3}"/>
+                <a16:creationId xmlns:a16="http://schemas.microsoft.com/office/drawing/2014/main" id="{C8FA1749-B91A-40E7-AD01-0B9C9C6AF74E}"/>
+              </a:ext>
+              <a:ext uri="{C183D7F6-B498-43B3-948B-1728B52AA6E4}">
+                <adec:decorative xmlns:adec="http://schemas.microsoft.com/office/drawing/2017/decorative" val="1"/>
+              </a:ext>
+            </a:extLst>
+          </p:cNvPr>
+          <p:cNvSpPr>
+            <a:spLocks noGrp="1" noRot="1" noChangeAspect="1" noMove="1" noResize="1" noEditPoints="1" noAdjustHandles="1" noChangeArrowheads="1" noChangeShapeType="1" noTextEdit="1"/>
+          </p:cNvSpPr>
+          <p:nvPr>
+            <p:extLst>
+              <p:ext uri="{386F3935-93C4-4BCD-93E2-E3B085C9AB24}">
+                <p16:designElem xmlns:p16="http://schemas.microsoft.com/office/powerpoint/2015/main" val="1"/>
+              </p:ext>
+            </p:extLst>
+          </p:nvPr>
+        </p:nvSpPr>
+        <p:spPr>
+          <a:xfrm>
+            <a:off x="4644527" y="0"/>
+            <a:ext cx="7552944" cy="6858001"/>
+          </a:xfrm>
+          <a:prstGeom prst="rect">
+            <a:avLst/>
+          </a:prstGeom>
+          <a:solidFill>
+            <a:schemeClr val="accent1"/>
+          </a:solidFill>
+          <a:ln>
+            <a:noFill/>
+          </a:ln>
+        </p:spPr>
+        <p:style>
+          <a:lnRef idx="2">
+            <a:schemeClr val="accent1">
+              <a:shade val="50000"/>
+            </a:schemeClr>
+          </a:lnRef>
+          <a:fillRef idx="1">
+            <a:schemeClr val="accent1"/>
+          </a:fillRef>
+          <a:effectRef idx="0">
+            <a:schemeClr val="accent1"/>
+          </a:effectRef>
+          <a:fontRef idx="minor">
+            <a:schemeClr val="lt1"/>
+          </a:fontRef>
+        </p:style>
+        <p:txBody>
+          <a:bodyPr rtlCol="0" anchor="ctr"/>
+          <a:lstStyle/>
+          <a:p>
+            <a:pPr algn="ctr"/>
+            <a:endParaRPr lang="en-US"/>
+          </a:p>
+        </p:txBody>
+      </p:sp>
+      <p:pic>
+        <p:nvPicPr>
+          <p:cNvPr id="14" name="Picture 13">
+            <a:extLst>
+              <a:ext uri="{FF2B5EF4-FFF2-40B4-BE49-F238E27FC236}">
+                <a16:creationId xmlns:a16="http://schemas.microsoft.com/office/drawing/2014/main" id="{3B7A934F-FFF7-4353-83D3-4EF66E93EEF8}"/>
+              </a:ext>
+              <a:ext uri="{C183D7F6-B498-43B3-948B-1728B52AA6E4}">
+                <adec:decorative xmlns:adec="http://schemas.microsoft.com/office/drawing/2017/decorative" val="1"/>
+              </a:ext>
+            </a:extLst>
+          </p:cNvPr>
+          <p:cNvPicPr>
+            <a:picLocks noGrp="1" noRot="1" noChangeAspect="1" noMove="1" noResize="1" noEditPoints="1" noAdjustHandles="1" noChangeArrowheads="1" noChangeShapeType="1" noCrop="1"/>
+          </p:cNvPicPr>
+          <p:nvPr>
+            <p:extLst>
+              <p:ext uri="{386F3935-93C4-4BCD-93E2-E3B085C9AB24}">
+                <p16:designElem xmlns:p16="http://schemas.microsoft.com/office/powerpoint/2015/main" val="1"/>
+              </p:ext>
+            </p:extLst>
+          </p:nvPr>
+        </p:nvPicPr>
+        <p:blipFill>
+          <a:blip r:embed="rId3" cstate="print">
+            <a:extLst>
+              <a:ext uri="{28A0092B-C50C-407E-A947-70E740481C1C}">
+                <a14:useLocalDpi xmlns:a14="http://schemas.microsoft.com/office/drawing/2010/main" val="0"/>
+              </a:ext>
+            </a:extLst>
+          </a:blip>
+          <a:stretch>
+            <a:fillRect/>
+          </a:stretch>
+        </p:blipFill>
+        <p:spPr>
+          <a:xfrm>
+            <a:off x="1" y="5006045"/>
+            <a:ext cx="4965192" cy="144668"/>
+          </a:xfrm>
+          <a:prstGeom prst="rect">
+            <a:avLst/>
+          </a:prstGeom>
+        </p:spPr>
+      </p:pic>
+      <p:sp>
+        <p:nvSpPr>
+          <p:cNvPr id="16" name="Rectangle 15">
+            <a:extLst>
+              <a:ext uri="{FF2B5EF4-FFF2-40B4-BE49-F238E27FC236}">
+                <a16:creationId xmlns:a16="http://schemas.microsoft.com/office/drawing/2014/main" id="{700676C8-6DE8-47DD-9A23-D42063A12E10}"/>
+              </a:ext>
+              <a:ext uri="{C183D7F6-B498-43B3-948B-1728B52AA6E4}">
+                <adec:decorative xmlns:adec="http://schemas.microsoft.com/office/drawing/2017/decorative" val="1"/>
+              </a:ext>
+            </a:extLst>
+          </p:cNvPr>
+          <p:cNvSpPr>
+            <a:spLocks noGrp="1" noRot="1" noChangeAspect="1" noMove="1" noResize="1" noEditPoints="1" noAdjustHandles="1" noChangeArrowheads="1" noChangeShapeType="1" noTextEdit="1"/>
+          </p:cNvSpPr>
+          <p:nvPr>
+            <p:extLst>
+              <p:ext uri="{386F3935-93C4-4BCD-93E2-E3B085C9AB24}">
+                <p16:designElem xmlns:p16="http://schemas.microsoft.com/office/powerpoint/2015/main" val="1"/>
+              </p:ext>
+            </p:extLst>
+          </p:nvPr>
+        </p:nvSpPr>
+        <p:spPr>
+          <a:xfrm>
+            <a:off x="-1" y="1838764"/>
+            <a:ext cx="4964567" cy="3180473"/>
+          </a:xfrm>
+          <a:prstGeom prst="rect">
+            <a:avLst/>
+          </a:prstGeom>
+          <a:solidFill>
+            <a:srgbClr val="262626"/>
+          </a:solidFill>
+          <a:ln>
+            <a:noFill/>
+          </a:ln>
+        </p:spPr>
+        <p:style>
+          <a:lnRef idx="2">
+            <a:schemeClr val="accent1">
+              <a:shade val="50000"/>
+            </a:schemeClr>
+          </a:lnRef>
+          <a:fillRef idx="1">
+            <a:schemeClr val="accent1"/>
+          </a:fillRef>
+          <a:effectRef idx="0">
+            <a:schemeClr val="accent1"/>
+          </a:effectRef>
+          <a:fontRef idx="minor">
+            <a:schemeClr val="lt1"/>
+          </a:fontRef>
+        </p:style>
+      </p:sp>
+      <p:sp>
+        <p:nvSpPr>
+          <p:cNvPr id="2" name="Tytuł 1">
+            <a:extLst>
+              <a:ext uri="{FF2B5EF4-FFF2-40B4-BE49-F238E27FC236}">
+                <a16:creationId xmlns:a16="http://schemas.microsoft.com/office/drawing/2014/main" id="{2294BD86-C7CC-47E5-9CA5-8D232644AAF8}"/>
+              </a:ext>
+            </a:extLst>
+          </p:cNvPr>
+          <p:cNvSpPr>
+            <a:spLocks noGrp="1"/>
+          </p:cNvSpPr>
+          <p:nvPr>
+            <p:ph type="title"/>
+          </p:nvPr>
+        </p:nvSpPr>
+        <p:spPr>
+          <a:xfrm>
+            <a:off x="680321" y="2063262"/>
+            <a:ext cx="3739279" cy="2661052"/>
+          </a:xfrm>
+        </p:spPr>
+        <p:txBody>
+          <a:bodyPr>
+            <a:normAutofit/>
+          </a:bodyPr>
+          <a:lstStyle/>
+          <a:p>
+            <a:pPr algn="r"/>
+            <a:r>
+              <a:rPr lang="pl-PL" sz="4400" dirty="0">
+                <a:solidFill>
+                  <a:srgbClr val="FFFFFF"/>
+                </a:solidFill>
+              </a:rPr>
+              <a:t>Aplikacja Android</a:t>
+            </a:r>
+          </a:p>
+        </p:txBody>
+      </p:sp>
+      <p:pic>
+        <p:nvPicPr>
+          <p:cNvPr id="5" name="Symbol zastępczy zawartości 4" descr="Obraz zawierający zrzut ekranu, rysunek&#10;&#10;Opis wygenerowany automatycznie">
+            <a:extLst>
+              <a:ext uri="{FF2B5EF4-FFF2-40B4-BE49-F238E27FC236}">
+                <a16:creationId xmlns:a16="http://schemas.microsoft.com/office/drawing/2014/main" id="{CE942DEC-B810-4C4D-817B-F9938F0BBBC9}"/>
+              </a:ext>
+            </a:extLst>
+          </p:cNvPr>
+          <p:cNvPicPr>
+            <a:picLocks noGrp="1" noChangeAspect="1"/>
+          </p:cNvPicPr>
+          <p:nvPr>
+            <p:ph idx="1"/>
+          </p:nvPr>
+        </p:nvPicPr>
+        <p:blipFill>
+          <a:blip r:embed="rId4"/>
+          <a:stretch>
+            <a:fillRect/>
+          </a:stretch>
+        </p:blipFill>
+        <p:spPr>
+          <a:xfrm>
+            <a:off x="6838029" y="0"/>
+            <a:ext cx="3165940" cy="6859538"/>
+          </a:xfrm>
+        </p:spPr>
+      </p:pic>
+      <p:sp>
+        <p:nvSpPr>
+          <p:cNvPr id="9" name="pole tekstowe 8">
+            <a:extLst>
+              <a:ext uri="{FF2B5EF4-FFF2-40B4-BE49-F238E27FC236}">
+                <a16:creationId xmlns:a16="http://schemas.microsoft.com/office/drawing/2014/main" id="{07418869-89C2-4082-B967-3CABD2195CD1}"/>
               </a:ext>
             </a:extLst>
           </p:cNvPr>
@@ -9304,8 +9705,8 @@
         </p:nvSpPr>
         <p:spPr>
           <a:xfrm>
-            <a:off x="3791824" y="2289871"/>
-            <a:ext cx="3984770" cy="3785652"/>
+            <a:off x="11367083" y="6488668"/>
+            <a:ext cx="860305" cy="369332"/>
           </a:xfrm>
           <a:prstGeom prst="rect">
             <a:avLst/>
@@ -9318,133 +9719,9 @@
           </a:bodyPr>
           <a:lstStyle/>
           <a:p>
-            <a:pPr marL="285750" lvl="0" indent="-285750">
-              <a:buFont typeface="Arial" panose="020B0604020202020204" pitchFamily="34" charset="0"/>
-              <a:buChar char="•"/>
-            </a:pPr>
-            <a:r>
-              <a:rPr lang="pl-PL" sz="2000" b="1" dirty="0"/>
-              <a:t>Aktualizacja</a:t>
-            </a:r>
-            <a:r>
-              <a:rPr lang="pl-PL" sz="2000" dirty="0"/>
-              <a:t> </a:t>
-            </a:r>
-            <a:r>
-              <a:rPr lang="pl-PL" sz="2000" b="1" dirty="0"/>
-              <a:t>oprogramowania</a:t>
-            </a:r>
-            <a:r>
-              <a:rPr lang="pl-PL" sz="2000" dirty="0"/>
-              <a:t>:</a:t>
-            </a:r>
-          </a:p>
-          <a:p>
             <a:r>
               <a:rPr lang="pl-PL" dirty="0"/>
-              <a:t>- UART,</a:t>
-            </a:r>
-            <a:br>
-              <a:rPr lang="pl-PL" dirty="0"/>
-            </a:br>
-            <a:r>
-              <a:rPr lang="pl-PL" dirty="0"/>
-              <a:t>- OTA.</a:t>
-            </a:r>
-          </a:p>
-          <a:p>
-            <a:pPr marL="285750" lvl="0" indent="-285750">
-              <a:buFont typeface="Arial" panose="020B0604020202020204" pitchFamily="34" charset="0"/>
-              <a:buChar char="•"/>
-            </a:pPr>
-            <a:r>
-              <a:rPr lang="pl-PL" sz="2000" b="1" dirty="0"/>
-              <a:t>CPU</a:t>
-            </a:r>
-            <a:r>
-              <a:rPr lang="pl-PL" sz="2000" dirty="0"/>
-              <a:t>:</a:t>
-            </a:r>
-          </a:p>
-          <a:p>
-            <a:r>
-              <a:rPr lang="pl-PL" dirty="0"/>
-              <a:t>- </a:t>
-            </a:r>
-            <a:r>
-              <a:rPr lang="pl-PL" dirty="0" err="1"/>
-              <a:t>Tensilica</a:t>
-            </a:r>
-            <a:r>
-              <a:rPr lang="pl-PL" dirty="0"/>
-              <a:t> L106 32-bit 80 MHz,</a:t>
-            </a:r>
-            <a:br>
-              <a:rPr lang="pl-PL" dirty="0"/>
-            </a:br>
-            <a:r>
-              <a:rPr lang="pl-PL" dirty="0"/>
-              <a:t>- obudowa: QFN32-pin (5 mm × 5 mm),</a:t>
-            </a:r>
-            <a:br>
-              <a:rPr lang="pl-PL" dirty="0"/>
-            </a:br>
-            <a:r>
-              <a:rPr lang="pl-PL" dirty="0"/>
-              <a:t>- interfejsy: UART/SDIO/SPI/I2C/I2S/IR (zdalne sterowanie),</a:t>
-            </a:r>
-            <a:br>
-              <a:rPr lang="pl-PL" dirty="0"/>
-            </a:br>
-            <a:r>
-              <a:rPr lang="pl-PL" dirty="0"/>
-              <a:t>- dostępne 10 GPIO,</a:t>
-            </a:r>
-            <a:br>
-              <a:rPr lang="pl-PL" dirty="0"/>
-            </a:br>
-            <a:r>
-              <a:rPr lang="pl-PL" dirty="0"/>
-              <a:t>- 1 wyprowadzenie ADC (0 – 3,3 V).</a:t>
-            </a:r>
-          </a:p>
-        </p:txBody>
-      </p:sp>
-      <p:sp>
-        <p:nvSpPr>
-          <p:cNvPr id="6" name="pole tekstowe 5">
-            <a:extLst>
-              <a:ext uri="{FF2B5EF4-FFF2-40B4-BE49-F238E27FC236}">
-                <a16:creationId xmlns:a16="http://schemas.microsoft.com/office/drawing/2014/main" id="{27E4428D-8D3B-46F2-B3F1-472FC28956EF}"/>
-              </a:ext>
-            </a:extLst>
-          </p:cNvPr>
-          <p:cNvSpPr txBox="1"/>
-          <p:nvPr/>
-        </p:nvSpPr>
-        <p:spPr>
-          <a:xfrm>
-            <a:off x="9047458" y="5489668"/>
-            <a:ext cx="1451295" cy="369332"/>
-          </a:xfrm>
-          <a:prstGeom prst="rect">
-            <a:avLst/>
-          </a:prstGeom>
-          <a:noFill/>
-        </p:spPr>
-        <p:txBody>
-          <a:bodyPr wrap="square" rtlCol="0">
-            <a:spAutoFit/>
-          </a:bodyPr>
-          <a:lstStyle/>
-          <a:p>
-            <a:r>
-              <a:rPr lang="pl-PL" dirty="0" err="1"/>
-              <a:t>Nodemcu</a:t>
-            </a:r>
-            <a:r>
-              <a:rPr lang="pl-PL" dirty="0"/>
-              <a:t> v3</a:t>
+              <a:t>13/16</a:t>
             </a:r>
           </a:p>
         </p:txBody>
@@ -9452,7 +9729,7 @@
     </p:spTree>
     <p:extLst>
       <p:ext uri="{BB962C8B-B14F-4D97-AF65-F5344CB8AC3E}">
-        <p14:creationId xmlns:p14="http://schemas.microsoft.com/office/powerpoint/2010/main" val="1598752641"/>
+        <p14:creationId xmlns:p14="http://schemas.microsoft.com/office/powerpoint/2010/main" val="2802582942"/>
       </p:ext>
     </p:extLst>
   </p:cSld>
@@ -9484,7 +9761,7 @@
           <p:cNvPr id="2" name="Tytuł 1">
             <a:extLst>
               <a:ext uri="{FF2B5EF4-FFF2-40B4-BE49-F238E27FC236}">
-                <a16:creationId xmlns:a16="http://schemas.microsoft.com/office/drawing/2014/main" id="{9988B2A7-31B6-401F-B0DC-110EB9341C24}"/>
+                <a16:creationId xmlns:a16="http://schemas.microsoft.com/office/drawing/2014/main" id="{84776CD2-899A-4263-BB7E-C0065E69C8CB}"/>
               </a:ext>
             </a:extLst>
           </p:cNvPr>
@@ -9510,7 +9787,7 @@
             </a:r>
             <a:r>
               <a:rPr lang="pl-PL" dirty="0"/>
-              <a:t> - Czujnik</a:t>
+              <a:t> - Mikrokontroler</a:t>
             </a:r>
           </a:p>
         </p:txBody>
@@ -9520,7 +9797,7 @@
           <p:cNvPr id="3" name="Symbol zastępczy zawartości 2">
             <a:extLst>
               <a:ext uri="{FF2B5EF4-FFF2-40B4-BE49-F238E27FC236}">
-                <a16:creationId xmlns:a16="http://schemas.microsoft.com/office/drawing/2014/main" id="{A6328C50-49B5-4BA6-9969-F2AE101E02D6}"/>
+                <a16:creationId xmlns:a16="http://schemas.microsoft.com/office/drawing/2014/main" id="{38A094A9-3A96-4045-BAAE-DE674BA25A76}"/>
               </a:ext>
             </a:extLst>
           </p:cNvPr>
@@ -9533,118 +9810,131 @@
         </p:nvSpPr>
         <p:spPr>
           <a:xfrm>
-            <a:off x="437040" y="2211038"/>
-            <a:ext cx="7104662" cy="4223318"/>
+            <a:off x="0" y="2367649"/>
+            <a:ext cx="3531765" cy="4226097"/>
           </a:xfrm>
         </p:spPr>
         <p:txBody>
           <a:bodyPr>
-            <a:normAutofit/>
+            <a:normAutofit fontScale="62500" lnSpcReduction="20000"/>
           </a:bodyPr>
           <a:lstStyle/>
           <a:p>
             <a:pPr lvl="0"/>
             <a:r>
-              <a:rPr lang="pl-PL" sz="2000" b="1" dirty="0"/>
-              <a:t>Ogólne</a:t>
-            </a:r>
-            <a:r>
-              <a:rPr lang="pl-PL" sz="2000" dirty="0"/>
+              <a:rPr lang="pl-PL" sz="2900" b="1" dirty="0"/>
+              <a:t>Komunikacja </a:t>
+            </a:r>
+            <a:r>
+              <a:rPr lang="pl-PL" sz="2900" b="1" dirty="0" err="1"/>
+              <a:t>WiFi</a:t>
+            </a:r>
+            <a:r>
+              <a:rPr lang="pl-PL" sz="2900" b="1" dirty="0"/>
               <a:t>:</a:t>
             </a:r>
+            <a:endParaRPr lang="pl-PL" sz="2900" dirty="0"/>
           </a:p>
           <a:p>
             <a:pPr marL="0" indent="0">
               <a:buNone/>
             </a:pPr>
             <a:r>
-              <a:rPr lang="pl-PL" sz="1800" dirty="0"/>
-              <a:t>- Napięcie zasilania: 3 V do 5,5 V</a:t>
+              <a:rPr lang="pl-PL" sz="2900" dirty="0"/>
+              <a:t>- standard 802.11 b/g/n 2,4 GHz,</a:t>
             </a:r>
             <a:br>
-              <a:rPr lang="pl-PL" sz="1800" dirty="0"/>
+              <a:rPr lang="pl-PL" sz="2900" dirty="0"/>
             </a:br>
             <a:r>
-              <a:rPr lang="pl-PL" sz="1800" dirty="0"/>
-              <a:t>- Pobór prądu: 0,2 </a:t>
-            </a:r>
-            <a:r>
-              <a:rPr lang="pl-PL" sz="1800" dirty="0" err="1"/>
+              <a:rPr lang="pl-PL" sz="2900" dirty="0"/>
+              <a:t>- prędkość transmisji do 72,2 </a:t>
+            </a:r>
+            <a:r>
+              <a:rPr lang="pl-PL" sz="2900" dirty="0" err="1"/>
+              <a:t>Mb</a:t>
+            </a:r>
+            <a:r>
+              <a:rPr lang="pl-PL" sz="2900" dirty="0"/>
+              <a:t>/s,</a:t>
+            </a:r>
+            <a:br>
+              <a:rPr lang="pl-PL" sz="2900" dirty="0"/>
+            </a:br>
+            <a:r>
+              <a:rPr lang="pl-PL" sz="2900" dirty="0"/>
+              <a:t>- zabezpieczenia: WPA/WPA2,</a:t>
+            </a:r>
+            <a:br>
+              <a:rPr lang="pl-PL" sz="2900" dirty="0"/>
+            </a:br>
+            <a:r>
+              <a:rPr lang="pl-PL" sz="2900" dirty="0"/>
+              <a:t>- szyfrowanie: WEP/TKIP/AES,</a:t>
+            </a:r>
+            <a:br>
+              <a:rPr lang="pl-PL" sz="2900" dirty="0"/>
+            </a:br>
+            <a:r>
+              <a:rPr lang="pl-PL" sz="2900" dirty="0"/>
+              <a:t>- protokoły: IPv4, TCP/UDP/HTTP.</a:t>
+            </a:r>
+          </a:p>
+          <a:p>
+            <a:pPr lvl="0"/>
+            <a:r>
+              <a:rPr lang="pl-PL" sz="2900" b="1" dirty="0"/>
+              <a:t>Zasilanie</a:t>
+            </a:r>
+            <a:r>
+              <a:rPr lang="pl-PL" sz="2900" dirty="0"/>
+              <a:t>:</a:t>
+            </a:r>
+          </a:p>
+          <a:p>
+            <a:pPr marL="0" indent="0">
+              <a:buNone/>
+            </a:pPr>
+            <a:r>
+              <a:rPr lang="pl-PL" sz="2900" dirty="0"/>
+              <a:t>- napięcie pracy: 2,5 – 3,6 V,</a:t>
+            </a:r>
+            <a:br>
+              <a:rPr lang="pl-PL" sz="2900" dirty="0"/>
+            </a:br>
+            <a:r>
+              <a:rPr lang="pl-PL" sz="2900" dirty="0"/>
+              <a:t>- napięcie zasilania: 4,8 – 12 V,</a:t>
+            </a:r>
+            <a:br>
+              <a:rPr lang="pl-PL" sz="2900" dirty="0"/>
+            </a:br>
+            <a:r>
+              <a:rPr lang="pl-PL" sz="2900" dirty="0"/>
+              <a:t>- średni pobór prądu: 80 </a:t>
+            </a:r>
+            <a:r>
+              <a:rPr lang="pl-PL" sz="2900" dirty="0" err="1"/>
               <a:t>mA</a:t>
             </a:r>
+            <a:r>
+              <a:rPr lang="pl-PL" sz="2900" dirty="0"/>
+              <a:t>,</a:t>
+            </a:r>
             <a:br>
-              <a:rPr lang="pl-PL" sz="1800" dirty="0"/>
+              <a:rPr lang="pl-PL" sz="2900" dirty="0"/>
             </a:br>
             <a:r>
-              <a:rPr lang="pl-PL" sz="1800" dirty="0"/>
-              <a:t>- Częstotliwość próbkowania: 1Hz</a:t>
-            </a:r>
-          </a:p>
-          <a:p>
-            <a:pPr lvl="0"/>
-            <a:r>
-              <a:rPr lang="pl-PL" sz="2000" b="1" dirty="0"/>
-              <a:t>Wbudowany</a:t>
-            </a:r>
-            <a:r>
-              <a:rPr lang="pl-PL" dirty="0"/>
-              <a:t> </a:t>
-            </a:r>
-            <a:r>
-              <a:rPr lang="pl-PL" b="1" dirty="0"/>
-              <a:t>termometr</a:t>
-            </a:r>
-            <a:endParaRPr lang="pl-PL" dirty="0"/>
-          </a:p>
-          <a:p>
-            <a:pPr marL="0" indent="0">
-              <a:buNone/>
-            </a:pPr>
-            <a:r>
-              <a:rPr lang="pl-PL" sz="1800" dirty="0"/>
-              <a:t>- Zakres pomiarowy: 0 - 50 °C</a:t>
-            </a:r>
-            <a:br>
-              <a:rPr lang="pl-PL" sz="1800" dirty="0"/>
-            </a:br>
-            <a:r>
-              <a:rPr lang="pl-PL" sz="1800" dirty="0"/>
-              <a:t>- Dokładność: ±2°C</a:t>
-            </a:r>
-          </a:p>
-          <a:p>
-            <a:pPr lvl="0"/>
-            <a:r>
-              <a:rPr lang="pl-PL" sz="2000" b="1" dirty="0"/>
-              <a:t>Czujnik</a:t>
-            </a:r>
-            <a:r>
-              <a:rPr lang="pl-PL" dirty="0"/>
-              <a:t> </a:t>
-            </a:r>
-            <a:r>
-              <a:rPr lang="pl-PL" b="1" dirty="0"/>
-              <a:t>wilgotności</a:t>
-            </a:r>
-            <a:r>
-              <a:rPr lang="pl-PL" dirty="0"/>
-              <a:t>:</a:t>
-            </a:r>
-          </a:p>
-          <a:p>
-            <a:pPr marL="0" indent="0">
-              <a:buNone/>
-            </a:pPr>
-            <a:r>
-              <a:rPr lang="pl-PL" sz="1800" dirty="0"/>
-              <a:t>- Zakres pomiarowy: 20 - 95%RH</a:t>
-            </a:r>
-            <a:br>
-              <a:rPr lang="pl-PL" sz="1800" dirty="0"/>
-            </a:br>
-            <a:r>
-              <a:rPr lang="pl-PL" sz="1800" dirty="0"/>
-              <a:t>- Dokładność: ±5%RH</a:t>
+              <a:rPr lang="pl-PL" sz="2900" dirty="0"/>
+              <a:t>- maksymalny pobór prądu: 800 </a:t>
+            </a:r>
+            <a:r>
+              <a:rPr lang="pl-PL" sz="2900" dirty="0" err="1"/>
+              <a:t>mA</a:t>
+            </a:r>
+            <a:r>
+              <a:rPr lang="pl-PL" sz="2900" dirty="0"/>
+              <a:t>.</a:t>
             </a:r>
           </a:p>
           <a:p>
@@ -9657,10 +9947,10 @@
       </p:sp>
       <p:pic>
         <p:nvPicPr>
-          <p:cNvPr id="4" name="Symbol zastępczy zawartości 4">
+          <p:cNvPr id="4" name="Symbol zastępczy zawartości 3">
             <a:extLst>
               <a:ext uri="{FF2B5EF4-FFF2-40B4-BE49-F238E27FC236}">
-                <a16:creationId xmlns:a16="http://schemas.microsoft.com/office/drawing/2014/main" id="{735EE96B-DBD2-4A61-A1DD-FAA8D25429DC}"/>
+                <a16:creationId xmlns:a16="http://schemas.microsoft.com/office/drawing/2014/main" id="{6FA39A1F-7AC8-4C9D-BC86-C98F3371FA4B}"/>
               </a:ext>
             </a:extLst>
           </p:cNvPr>
@@ -9677,8 +9967,8 @@
         </p:blipFill>
         <p:spPr>
           <a:xfrm>
-            <a:off x="8195315" y="2419142"/>
-            <a:ext cx="3254192" cy="3254192"/>
+            <a:off x="7862170" y="2733060"/>
+            <a:ext cx="3821873" cy="2756608"/>
           </a:xfrm>
           <a:prstGeom prst="rect">
             <a:avLst/>
@@ -9690,7 +9980,7 @@
           <p:cNvPr id="5" name="pole tekstowe 4">
             <a:extLst>
               <a:ext uri="{FF2B5EF4-FFF2-40B4-BE49-F238E27FC236}">
-                <a16:creationId xmlns:a16="http://schemas.microsoft.com/office/drawing/2014/main" id="{96ABFC37-E0D9-4FEA-AB9C-E99E47A04F1B}"/>
+                <a16:creationId xmlns:a16="http://schemas.microsoft.com/office/drawing/2014/main" id="{68D0C849-E0DE-45B0-818D-74E9C197FDD3}"/>
               </a:ext>
             </a:extLst>
           </p:cNvPr>
@@ -9699,8 +9989,8 @@
         </p:nvSpPr>
         <p:spPr>
           <a:xfrm>
-            <a:off x="9344238" y="5805182"/>
-            <a:ext cx="956345" cy="369332"/>
+            <a:off x="3791824" y="2289871"/>
+            <a:ext cx="3984770" cy="3785652"/>
           </a:xfrm>
           <a:prstGeom prst="rect">
             <a:avLst/>
@@ -9713,9 +10003,168 @@
           </a:bodyPr>
           <a:lstStyle/>
           <a:p>
+            <a:pPr marL="285750" lvl="0" indent="-285750">
+              <a:buFont typeface="Arial" panose="020B0604020202020204" pitchFamily="34" charset="0"/>
+              <a:buChar char="•"/>
+            </a:pPr>
+            <a:r>
+              <a:rPr lang="pl-PL" sz="2000" b="1" dirty="0"/>
+              <a:t>Aktualizacja</a:t>
+            </a:r>
+            <a:r>
+              <a:rPr lang="pl-PL" sz="2000" dirty="0"/>
+              <a:t> </a:t>
+            </a:r>
+            <a:r>
+              <a:rPr lang="pl-PL" sz="2000" b="1" dirty="0"/>
+              <a:t>oprogramowania</a:t>
+            </a:r>
+            <a:r>
+              <a:rPr lang="pl-PL" sz="2000" dirty="0"/>
+              <a:t>:</a:t>
+            </a:r>
+          </a:p>
+          <a:p>
             <a:r>
               <a:rPr lang="pl-PL" dirty="0"/>
-              <a:t>DHT11</a:t>
+              <a:t>- UART,</a:t>
+            </a:r>
+            <a:br>
+              <a:rPr lang="pl-PL" dirty="0"/>
+            </a:br>
+            <a:r>
+              <a:rPr lang="pl-PL" dirty="0"/>
+              <a:t>- OTA.</a:t>
+            </a:r>
+          </a:p>
+          <a:p>
+            <a:pPr marL="285750" lvl="0" indent="-285750">
+              <a:buFont typeface="Arial" panose="020B0604020202020204" pitchFamily="34" charset="0"/>
+              <a:buChar char="•"/>
+            </a:pPr>
+            <a:r>
+              <a:rPr lang="pl-PL" sz="2000" b="1" dirty="0"/>
+              <a:t>CPU</a:t>
+            </a:r>
+            <a:r>
+              <a:rPr lang="pl-PL" sz="2000" dirty="0"/>
+              <a:t>:</a:t>
+            </a:r>
+          </a:p>
+          <a:p>
+            <a:r>
+              <a:rPr lang="pl-PL" dirty="0"/>
+              <a:t>- </a:t>
+            </a:r>
+            <a:r>
+              <a:rPr lang="pl-PL" dirty="0" err="1"/>
+              <a:t>Tensilica</a:t>
+            </a:r>
+            <a:r>
+              <a:rPr lang="pl-PL" dirty="0"/>
+              <a:t> L106 32-bit 80 MHz,</a:t>
+            </a:r>
+            <a:br>
+              <a:rPr lang="pl-PL" dirty="0"/>
+            </a:br>
+            <a:r>
+              <a:rPr lang="pl-PL" dirty="0"/>
+              <a:t>- obudowa: QFN32-pin (5 mm × 5 mm),</a:t>
+            </a:r>
+            <a:br>
+              <a:rPr lang="pl-PL" dirty="0"/>
+            </a:br>
+            <a:r>
+              <a:rPr lang="pl-PL" dirty="0"/>
+              <a:t>- interfejsy: UART/SDIO/SPI/I2C/I2S/IR (zdalne sterowanie),</a:t>
+            </a:r>
+            <a:br>
+              <a:rPr lang="pl-PL" dirty="0"/>
+            </a:br>
+            <a:r>
+              <a:rPr lang="pl-PL" dirty="0"/>
+              <a:t>- dostępne 10 GPIO,</a:t>
+            </a:r>
+            <a:br>
+              <a:rPr lang="pl-PL" dirty="0"/>
+            </a:br>
+            <a:r>
+              <a:rPr lang="pl-PL" dirty="0"/>
+              <a:t>- 1 wyprowadzenie ADC (0 – 3,3 V).</a:t>
+            </a:r>
+          </a:p>
+        </p:txBody>
+      </p:sp>
+      <p:sp>
+        <p:nvSpPr>
+          <p:cNvPr id="6" name="pole tekstowe 5">
+            <a:extLst>
+              <a:ext uri="{FF2B5EF4-FFF2-40B4-BE49-F238E27FC236}">
+                <a16:creationId xmlns:a16="http://schemas.microsoft.com/office/drawing/2014/main" id="{27E4428D-8D3B-46F2-B3F1-472FC28956EF}"/>
+              </a:ext>
+            </a:extLst>
+          </p:cNvPr>
+          <p:cNvSpPr txBox="1"/>
+          <p:nvPr/>
+        </p:nvSpPr>
+        <p:spPr>
+          <a:xfrm>
+            <a:off x="9047458" y="5489668"/>
+            <a:ext cx="1451295" cy="369332"/>
+          </a:xfrm>
+          <a:prstGeom prst="rect">
+            <a:avLst/>
+          </a:prstGeom>
+          <a:noFill/>
+        </p:spPr>
+        <p:txBody>
+          <a:bodyPr wrap="square" rtlCol="0">
+            <a:spAutoFit/>
+          </a:bodyPr>
+          <a:lstStyle/>
+          <a:p>
+            <a:r>
+              <a:rPr lang="pl-PL" dirty="0" err="1"/>
+              <a:t>Nodemcu</a:t>
+            </a:r>
+            <a:r>
+              <a:rPr lang="pl-PL" dirty="0"/>
+              <a:t> v3</a:t>
+            </a:r>
+          </a:p>
+        </p:txBody>
+      </p:sp>
+      <p:sp>
+        <p:nvSpPr>
+          <p:cNvPr id="7" name="pole tekstowe 6">
+            <a:extLst>
+              <a:ext uri="{FF2B5EF4-FFF2-40B4-BE49-F238E27FC236}">
+                <a16:creationId xmlns:a16="http://schemas.microsoft.com/office/drawing/2014/main" id="{E219D1C8-5D1B-471F-91B7-8BD03346DB0A}"/>
+              </a:ext>
+            </a:extLst>
+          </p:cNvPr>
+          <p:cNvSpPr txBox="1"/>
+          <p:nvPr/>
+        </p:nvSpPr>
+        <p:spPr>
+          <a:xfrm>
+            <a:off x="11367083" y="6488668"/>
+            <a:ext cx="860305" cy="369332"/>
+          </a:xfrm>
+          <a:prstGeom prst="rect">
+            <a:avLst/>
+          </a:prstGeom>
+          <a:noFill/>
+        </p:spPr>
+        <p:txBody>
+          <a:bodyPr wrap="square" rtlCol="0">
+            <a:spAutoFit/>
+          </a:bodyPr>
+          <a:lstStyle/>
+          <a:p>
+            <a:r>
+              <a:rPr lang="pl-PL" dirty="0"/>
+              <a:t>14/16</a:t>
             </a:r>
           </a:p>
         </p:txBody>
@@ -9723,7 +10172,7 @@
     </p:spTree>
     <p:extLst>
       <p:ext uri="{BB962C8B-B14F-4D97-AF65-F5344CB8AC3E}">
-        <p14:creationId xmlns:p14="http://schemas.microsoft.com/office/powerpoint/2010/main" val="3974088952"/>
+        <p14:creationId xmlns:p14="http://schemas.microsoft.com/office/powerpoint/2010/main" val="1598752641"/>
       </p:ext>
     </p:extLst>
   </p:cSld>
@@ -9752,6 +10201,312 @@
       </p:grpSpPr>
       <p:sp>
         <p:nvSpPr>
+          <p:cNvPr id="2" name="Tytuł 1">
+            <a:extLst>
+              <a:ext uri="{FF2B5EF4-FFF2-40B4-BE49-F238E27FC236}">
+                <a16:creationId xmlns:a16="http://schemas.microsoft.com/office/drawing/2014/main" id="{9988B2A7-31B6-401F-B0DC-110EB9341C24}"/>
+              </a:ext>
+            </a:extLst>
+          </p:cNvPr>
+          <p:cNvSpPr>
+            <a:spLocks noGrp="1"/>
+          </p:cNvSpPr>
+          <p:nvPr>
+            <p:ph type="title"/>
+          </p:nvPr>
+        </p:nvSpPr>
+        <p:spPr/>
+        <p:txBody>
+          <a:bodyPr/>
+          <a:lstStyle/>
+          <a:p>
+            <a:r>
+              <a:rPr lang="pl-PL" dirty="0"/>
+              <a:t>Przykładowe </a:t>
+            </a:r>
+            <a:r>
+              <a:rPr lang="pl-PL" dirty="0" err="1"/>
+              <a:t>IoT</a:t>
+            </a:r>
+            <a:r>
+              <a:rPr lang="pl-PL" dirty="0"/>
+              <a:t> - Czujnik</a:t>
+            </a:r>
+          </a:p>
+        </p:txBody>
+      </p:sp>
+      <p:sp>
+        <p:nvSpPr>
+          <p:cNvPr id="3" name="Symbol zastępczy zawartości 2">
+            <a:extLst>
+              <a:ext uri="{FF2B5EF4-FFF2-40B4-BE49-F238E27FC236}">
+                <a16:creationId xmlns:a16="http://schemas.microsoft.com/office/drawing/2014/main" id="{A6328C50-49B5-4BA6-9969-F2AE101E02D6}"/>
+              </a:ext>
+            </a:extLst>
+          </p:cNvPr>
+          <p:cNvSpPr>
+            <a:spLocks noGrp="1"/>
+          </p:cNvSpPr>
+          <p:nvPr>
+            <p:ph idx="1"/>
+          </p:nvPr>
+        </p:nvSpPr>
+        <p:spPr>
+          <a:xfrm>
+            <a:off x="437040" y="2211038"/>
+            <a:ext cx="7104662" cy="4223318"/>
+          </a:xfrm>
+        </p:spPr>
+        <p:txBody>
+          <a:bodyPr>
+            <a:normAutofit/>
+          </a:bodyPr>
+          <a:lstStyle/>
+          <a:p>
+            <a:pPr lvl="0"/>
+            <a:r>
+              <a:rPr lang="pl-PL" sz="2000" b="1" dirty="0"/>
+              <a:t>Ogólne</a:t>
+            </a:r>
+            <a:r>
+              <a:rPr lang="pl-PL" sz="2000" dirty="0"/>
+              <a:t>:</a:t>
+            </a:r>
+          </a:p>
+          <a:p>
+            <a:pPr marL="0" indent="0">
+              <a:buNone/>
+            </a:pPr>
+            <a:r>
+              <a:rPr lang="pl-PL" sz="1800" dirty="0"/>
+              <a:t>- Napięcie zasilania: 3 V do 5,5 V</a:t>
+            </a:r>
+            <a:br>
+              <a:rPr lang="pl-PL" sz="1800" dirty="0"/>
+            </a:br>
+            <a:r>
+              <a:rPr lang="pl-PL" sz="1800" dirty="0"/>
+              <a:t>- Pobór prądu: 0,2 </a:t>
+            </a:r>
+            <a:r>
+              <a:rPr lang="pl-PL" sz="1800" dirty="0" err="1"/>
+              <a:t>mA</a:t>
+            </a:r>
+            <a:br>
+              <a:rPr lang="pl-PL" sz="1800" dirty="0"/>
+            </a:br>
+            <a:r>
+              <a:rPr lang="pl-PL" sz="1800" dirty="0"/>
+              <a:t>- Częstotliwość próbkowania: 1Hz</a:t>
+            </a:r>
+          </a:p>
+          <a:p>
+            <a:pPr lvl="0"/>
+            <a:r>
+              <a:rPr lang="pl-PL" sz="2000" b="1" dirty="0"/>
+              <a:t>Wbudowany</a:t>
+            </a:r>
+            <a:r>
+              <a:rPr lang="pl-PL" dirty="0"/>
+              <a:t> </a:t>
+            </a:r>
+            <a:r>
+              <a:rPr lang="pl-PL" b="1" dirty="0"/>
+              <a:t>termometr</a:t>
+            </a:r>
+            <a:endParaRPr lang="pl-PL" dirty="0"/>
+          </a:p>
+          <a:p>
+            <a:pPr marL="0" indent="0">
+              <a:buNone/>
+            </a:pPr>
+            <a:r>
+              <a:rPr lang="pl-PL" sz="1800" dirty="0"/>
+              <a:t>- Zakres pomiarowy: 0 - 50 °C</a:t>
+            </a:r>
+            <a:br>
+              <a:rPr lang="pl-PL" sz="1800" dirty="0"/>
+            </a:br>
+            <a:r>
+              <a:rPr lang="pl-PL" sz="1800" dirty="0"/>
+              <a:t>- Dokładność: ±2°C</a:t>
+            </a:r>
+          </a:p>
+          <a:p>
+            <a:pPr lvl="0"/>
+            <a:r>
+              <a:rPr lang="pl-PL" sz="2000" b="1" dirty="0"/>
+              <a:t>Czujnik</a:t>
+            </a:r>
+            <a:r>
+              <a:rPr lang="pl-PL" dirty="0"/>
+              <a:t> </a:t>
+            </a:r>
+            <a:r>
+              <a:rPr lang="pl-PL" b="1" dirty="0"/>
+              <a:t>wilgotności</a:t>
+            </a:r>
+            <a:r>
+              <a:rPr lang="pl-PL" dirty="0"/>
+              <a:t>:</a:t>
+            </a:r>
+          </a:p>
+          <a:p>
+            <a:pPr marL="0" indent="0">
+              <a:buNone/>
+            </a:pPr>
+            <a:r>
+              <a:rPr lang="pl-PL" sz="1800" dirty="0"/>
+              <a:t>- Zakres pomiarowy: 20 - 95%RH</a:t>
+            </a:r>
+            <a:br>
+              <a:rPr lang="pl-PL" sz="1800" dirty="0"/>
+            </a:br>
+            <a:r>
+              <a:rPr lang="pl-PL" sz="1800" dirty="0"/>
+              <a:t>- Dokładność: ±5%RH</a:t>
+            </a:r>
+          </a:p>
+          <a:p>
+            <a:pPr marL="0" indent="0">
+              <a:buNone/>
+            </a:pPr>
+            <a:endParaRPr lang="pl-PL" dirty="0"/>
+          </a:p>
+        </p:txBody>
+      </p:sp>
+      <p:pic>
+        <p:nvPicPr>
+          <p:cNvPr id="4" name="Symbol zastępczy zawartości 4">
+            <a:extLst>
+              <a:ext uri="{FF2B5EF4-FFF2-40B4-BE49-F238E27FC236}">
+                <a16:creationId xmlns:a16="http://schemas.microsoft.com/office/drawing/2014/main" id="{735EE96B-DBD2-4A61-A1DD-FAA8D25429DC}"/>
+              </a:ext>
+            </a:extLst>
+          </p:cNvPr>
+          <p:cNvPicPr>
+            <a:picLocks noChangeAspect="1"/>
+          </p:cNvPicPr>
+          <p:nvPr/>
+        </p:nvPicPr>
+        <p:blipFill>
+          <a:blip r:embed="rId2"/>
+          <a:stretch>
+            <a:fillRect/>
+          </a:stretch>
+        </p:blipFill>
+        <p:spPr>
+          <a:xfrm>
+            <a:off x="8195315" y="2419142"/>
+            <a:ext cx="3254192" cy="3254192"/>
+          </a:xfrm>
+          <a:prstGeom prst="rect">
+            <a:avLst/>
+          </a:prstGeom>
+        </p:spPr>
+      </p:pic>
+      <p:sp>
+        <p:nvSpPr>
+          <p:cNvPr id="5" name="pole tekstowe 4">
+            <a:extLst>
+              <a:ext uri="{FF2B5EF4-FFF2-40B4-BE49-F238E27FC236}">
+                <a16:creationId xmlns:a16="http://schemas.microsoft.com/office/drawing/2014/main" id="{96ABFC37-E0D9-4FEA-AB9C-E99E47A04F1B}"/>
+              </a:ext>
+            </a:extLst>
+          </p:cNvPr>
+          <p:cNvSpPr txBox="1"/>
+          <p:nvPr/>
+        </p:nvSpPr>
+        <p:spPr>
+          <a:xfrm>
+            <a:off x="9344238" y="5805182"/>
+            <a:ext cx="956345" cy="369332"/>
+          </a:xfrm>
+          <a:prstGeom prst="rect">
+            <a:avLst/>
+          </a:prstGeom>
+          <a:noFill/>
+        </p:spPr>
+        <p:txBody>
+          <a:bodyPr wrap="square" rtlCol="0">
+            <a:spAutoFit/>
+          </a:bodyPr>
+          <a:lstStyle/>
+          <a:p>
+            <a:r>
+              <a:rPr lang="pl-PL" dirty="0"/>
+              <a:t>DHT11</a:t>
+            </a:r>
+          </a:p>
+        </p:txBody>
+      </p:sp>
+      <p:sp>
+        <p:nvSpPr>
+          <p:cNvPr id="6" name="pole tekstowe 5">
+            <a:extLst>
+              <a:ext uri="{FF2B5EF4-FFF2-40B4-BE49-F238E27FC236}">
+                <a16:creationId xmlns:a16="http://schemas.microsoft.com/office/drawing/2014/main" id="{0244F708-8D79-4ACF-87AA-60DD96D8DC89}"/>
+              </a:ext>
+            </a:extLst>
+          </p:cNvPr>
+          <p:cNvSpPr txBox="1"/>
+          <p:nvPr/>
+        </p:nvSpPr>
+        <p:spPr>
+          <a:xfrm>
+            <a:off x="11367083" y="6488668"/>
+            <a:ext cx="860305" cy="369332"/>
+          </a:xfrm>
+          <a:prstGeom prst="rect">
+            <a:avLst/>
+          </a:prstGeom>
+          <a:noFill/>
+        </p:spPr>
+        <p:txBody>
+          <a:bodyPr wrap="square" rtlCol="0">
+            <a:spAutoFit/>
+          </a:bodyPr>
+          <a:lstStyle/>
+          <a:p>
+            <a:r>
+              <a:rPr lang="pl-PL" dirty="0"/>
+              <a:t>15/16</a:t>
+            </a:r>
+          </a:p>
+        </p:txBody>
+      </p:sp>
+    </p:spTree>
+    <p:extLst>
+      <p:ext uri="{BB962C8B-B14F-4D97-AF65-F5344CB8AC3E}">
+        <p14:creationId xmlns:p14="http://schemas.microsoft.com/office/powerpoint/2010/main" val="3974088952"/>
+      </p:ext>
+    </p:extLst>
+  </p:cSld>
+  <p:clrMapOvr>
+    <a:masterClrMapping/>
+  </p:clrMapOvr>
+</p:sld>
+</file>
+
+<file path=ppt/slides/slide16.xml><?xml version="1.0" encoding="utf-8"?>
+<p:sld xmlns:a="http://schemas.openxmlformats.org/drawingml/2006/main" xmlns:r="http://schemas.openxmlformats.org/officeDocument/2006/relationships" xmlns:p="http://schemas.openxmlformats.org/presentationml/2006/main">
+  <p:cSld>
+    <p:spTree>
+      <p:nvGrpSpPr>
+        <p:cNvPr id="1" name=""/>
+        <p:cNvGrpSpPr/>
+        <p:nvPr/>
+      </p:nvGrpSpPr>
+      <p:grpSpPr>
+        <a:xfrm>
+          <a:off x="0" y="0"/>
+          <a:ext cx="0" cy="0"/>
+          <a:chOff x="0" y="0"/>
+          <a:chExt cx="0" cy="0"/>
+        </a:xfrm>
+      </p:grpSpPr>
+      <p:sp>
+        <p:nvSpPr>
           <p:cNvPr id="4" name="Prostokąt 3">
             <a:extLst>
               <a:ext uri="{FF2B5EF4-FFF2-40B4-BE49-F238E27FC236}">
@@ -9764,7 +10519,7 @@
         </p:nvSpPr>
         <p:spPr>
           <a:xfrm>
-            <a:off x="2654994" y="2852005"/>
+            <a:off x="2654994" y="3280601"/>
             <a:ext cx="6882012" cy="923330"/>
           </a:xfrm>
           <a:prstGeom prst="rect">
@@ -9795,6 +10550,46 @@
               </a:rPr>
               <a:t>Dziękujemy za uwagę</a:t>
             </a:r>
+          </a:p>
+        </p:txBody>
+      </p:sp>
+      <p:sp>
+        <p:nvSpPr>
+          <p:cNvPr id="2" name="pole tekstowe 1">
+            <a:extLst>
+              <a:ext uri="{FF2B5EF4-FFF2-40B4-BE49-F238E27FC236}">
+                <a16:creationId xmlns:a16="http://schemas.microsoft.com/office/drawing/2014/main" id="{6C0FF6FB-C741-4C14-87AF-E5012947393B}"/>
+              </a:ext>
+            </a:extLst>
+          </p:cNvPr>
+          <p:cNvSpPr txBox="1"/>
+          <p:nvPr/>
+        </p:nvSpPr>
+        <p:spPr>
+          <a:xfrm>
+            <a:off x="743824" y="352149"/>
+            <a:ext cx="10704352" cy="1754326"/>
+          </a:xfrm>
+          <a:prstGeom prst="rect">
+            <a:avLst/>
+          </a:prstGeom>
+          <a:noFill/>
+        </p:spPr>
+        <p:txBody>
+          <a:bodyPr wrap="square" rtlCol="0">
+            <a:spAutoFit/>
+          </a:bodyPr>
+          <a:lstStyle/>
+          <a:p>
+            <a:r>
+              <a:rPr lang="pl-PL" sz="5400" i="1" dirty="0"/>
+              <a:t>Elastyczna aplikacja do zarządzania urządzeniami </a:t>
+            </a:r>
+            <a:r>
+              <a:rPr lang="pl-PL" sz="5400" i="1" dirty="0" err="1"/>
+              <a:t>IoT</a:t>
+            </a:r>
+            <a:endParaRPr lang="pl-PL" sz="5400" dirty="0"/>
           </a:p>
         </p:txBody>
       </p:sp>
@@ -10052,6 +10847,41 @@
           </a:extLst>
         </p:spPr>
       </p:pic>
+      <p:sp>
+        <p:nvSpPr>
+          <p:cNvPr id="4" name="pole tekstowe 3">
+            <a:extLst>
+              <a:ext uri="{FF2B5EF4-FFF2-40B4-BE49-F238E27FC236}">
+                <a16:creationId xmlns:a16="http://schemas.microsoft.com/office/drawing/2014/main" id="{86F3697F-764A-4BA5-A3EF-9954C6EF1C3D}"/>
+              </a:ext>
+            </a:extLst>
+          </p:cNvPr>
+          <p:cNvSpPr txBox="1"/>
+          <p:nvPr/>
+        </p:nvSpPr>
+        <p:spPr>
+          <a:xfrm>
+            <a:off x="11455601" y="6488668"/>
+            <a:ext cx="771787" cy="369332"/>
+          </a:xfrm>
+          <a:prstGeom prst="rect">
+            <a:avLst/>
+          </a:prstGeom>
+          <a:noFill/>
+        </p:spPr>
+        <p:txBody>
+          <a:bodyPr wrap="square" rtlCol="0">
+            <a:spAutoFit/>
+          </a:bodyPr>
+          <a:lstStyle/>
+          <a:p>
+            <a:r>
+              <a:rPr lang="pl-PL" dirty="0"/>
+              <a:t>2/16</a:t>
+            </a:r>
+          </a:p>
+        </p:txBody>
+      </p:sp>
     </p:spTree>
     <p:extLst>
       <p:ext uri="{BB962C8B-B14F-4D97-AF65-F5344CB8AC3E}">
@@ -10454,6 +11284,35 @@
           </a:bodyPr>
           <a:lstStyle/>
           <a:p>
+            <a:pPr marL="0" indent="0">
+              <a:buNone/>
+            </a:pPr>
+            <a:r>
+              <a:rPr lang="pl-PL" sz="2000" dirty="0">
+                <a:solidFill>
+                  <a:srgbClr val="FFFFFF"/>
+                </a:solidFill>
+              </a:rPr>
+              <a:t>Cele opracowane na podstawie wymagań złożonych przez firmę </a:t>
+            </a:r>
+            <a:r>
+              <a:rPr lang="pl-PL" sz="2000" dirty="0" err="1">
+                <a:solidFill>
+                  <a:srgbClr val="FFFFFF"/>
+                </a:solidFill>
+              </a:rPr>
+              <a:t>InterElcom</a:t>
+            </a:r>
+            <a:r>
+              <a:rPr lang="pl-PL" sz="2000" dirty="0">
+                <a:solidFill>
+                  <a:srgbClr val="FFFFFF"/>
+                </a:solidFill>
+              </a:rPr>
+              <a:t>.</a:t>
+            </a:r>
+          </a:p>
+          <a:p>
             <a:pPr marL="514350" indent="-514350">
               <a:buFont typeface="+mj-lt"/>
               <a:buAutoNum type="arabicPeriod"/>
@@ -10478,6 +11337,20 @@
                   <a:srgbClr val="FFFFFF"/>
                 </a:solidFill>
               </a:rPr>
+              <a:t>Początkowa implementacja HTTP i MQTT</a:t>
+            </a:r>
+          </a:p>
+          <a:p>
+            <a:pPr marL="514350" indent="-514350">
+              <a:buFont typeface="+mj-lt"/>
+              <a:buAutoNum type="arabicPeriod"/>
+            </a:pPr>
+            <a:r>
+              <a:rPr lang="pl-PL" sz="2000" dirty="0">
+                <a:solidFill>
+                  <a:srgbClr val="FFFFFF"/>
+                </a:solidFill>
+              </a:rPr>
               <a:t>Wsparcie dwóch różnych platform. </a:t>
             </a:r>
           </a:p>
@@ -10493,6 +11366,114 @@
                 </a:solidFill>
               </a:rPr>
               <a:t>Przygotowanie przykładowego systemu wykorzystującego naszą aplikację.</a:t>
+            </a:r>
+          </a:p>
+          <a:p>
+            <a:pPr marL="514350" indent="-514350">
+              <a:buFont typeface="+mj-lt"/>
+              <a:buAutoNum type="arabicPeriod"/>
+            </a:pPr>
+            <a:r>
+              <a:rPr lang="pl-PL" sz="2000" dirty="0">
+                <a:solidFill>
+                  <a:srgbClr val="FFFFFF"/>
+                </a:solidFill>
+              </a:rPr>
+              <a:t>Wykorzystanie </a:t>
+            </a:r>
+            <a:r>
+              <a:rPr lang="pl-PL" sz="2000" dirty="0" err="1">
+                <a:solidFill>
+                  <a:srgbClr val="FFFFFF"/>
+                </a:solidFill>
+              </a:rPr>
+              <a:t>frameworku</a:t>
+            </a:r>
+            <a:r>
+              <a:rPr lang="pl-PL" sz="2000" dirty="0">
+                <a:solidFill>
+                  <a:srgbClr val="FFFFFF"/>
+                </a:solidFill>
+              </a:rPr>
+              <a:t> </a:t>
+            </a:r>
+            <a:r>
+              <a:rPr lang="pl-PL" sz="2000" dirty="0" err="1">
+                <a:solidFill>
+                  <a:srgbClr val="FFFFFF"/>
+                </a:solidFill>
+              </a:rPr>
+              <a:t>Qt</a:t>
+            </a:r>
+            <a:endParaRPr lang="pl-PL" sz="2000" dirty="0">
+              <a:solidFill>
+                <a:srgbClr val="FFFFFF"/>
+              </a:solidFill>
+            </a:endParaRPr>
+          </a:p>
+        </p:txBody>
+      </p:sp>
+      <p:pic>
+        <p:nvPicPr>
+          <p:cNvPr id="5" name="Obraz 4" descr="Obraz zawierający rysunek, znak&#10;&#10;Opis wygenerowany automatycznie">
+            <a:extLst>
+              <a:ext uri="{FF2B5EF4-FFF2-40B4-BE49-F238E27FC236}">
+                <a16:creationId xmlns:a16="http://schemas.microsoft.com/office/drawing/2014/main" id="{12478950-DF06-4471-8761-52F33C72AE0D}"/>
+              </a:ext>
+            </a:extLst>
+          </p:cNvPr>
+          <p:cNvPicPr>
+            <a:picLocks noChangeAspect="1"/>
+          </p:cNvPicPr>
+          <p:nvPr/>
+        </p:nvPicPr>
+        <p:blipFill>
+          <a:blip r:embed="rId4"/>
+          <a:stretch>
+            <a:fillRect/>
+          </a:stretch>
+        </p:blipFill>
+        <p:spPr>
+          <a:xfrm>
+            <a:off x="5059239" y="315707"/>
+            <a:ext cx="6184127" cy="1142857"/>
+          </a:xfrm>
+          <a:prstGeom prst="rect">
+            <a:avLst/>
+          </a:prstGeom>
+        </p:spPr>
+      </p:pic>
+      <p:sp>
+        <p:nvSpPr>
+          <p:cNvPr id="11" name="pole tekstowe 10">
+            <a:extLst>
+              <a:ext uri="{FF2B5EF4-FFF2-40B4-BE49-F238E27FC236}">
+                <a16:creationId xmlns:a16="http://schemas.microsoft.com/office/drawing/2014/main" id="{C63924CD-ABAB-4F9D-860E-B2DCD076D797}"/>
+              </a:ext>
+            </a:extLst>
+          </p:cNvPr>
+          <p:cNvSpPr txBox="1"/>
+          <p:nvPr/>
+        </p:nvSpPr>
+        <p:spPr>
+          <a:xfrm>
+            <a:off x="11425684" y="6488668"/>
+            <a:ext cx="771787" cy="369332"/>
+          </a:xfrm>
+          <a:prstGeom prst="rect">
+            <a:avLst/>
+          </a:prstGeom>
+          <a:noFill/>
+        </p:spPr>
+        <p:txBody>
+          <a:bodyPr wrap="square" rtlCol="0">
+            <a:spAutoFit/>
+          </a:bodyPr>
+          <a:lstStyle/>
+          <a:p>
+            <a:r>
+              <a:rPr lang="pl-PL" dirty="0"/>
+              <a:t>3/16</a:t>
             </a:r>
           </a:p>
         </p:txBody>
@@ -10532,7 +11513,7 @@
           <p:cNvPr id="2" name="Tytuł 1">
             <a:extLst>
               <a:ext uri="{FF2B5EF4-FFF2-40B4-BE49-F238E27FC236}">
-                <a16:creationId xmlns:a16="http://schemas.microsoft.com/office/drawing/2014/main" id="{F5F4C84B-0955-4630-8756-24C6D0CDE4F4}"/>
+                <a16:creationId xmlns:a16="http://schemas.microsoft.com/office/drawing/2014/main" id="{501E51D8-C7D0-4342-99D2-FC159A9461C0}"/>
               </a:ext>
             </a:extLst>
           </p:cNvPr>
@@ -10550,104 +11531,114 @@
           <a:p>
             <a:r>
               <a:rPr lang="pl-PL" dirty="0"/>
-              <a:t>Wybrane środowiska</a:t>
-            </a:r>
+              <a:t>Schemat projektu</a:t>
+            </a:r>
+          </a:p>
+        </p:txBody>
+      </p:sp>
+      <p:sp>
+        <p:nvSpPr>
+          <p:cNvPr id="3" name="Symbol zastępczy zawartości 2">
+            <a:extLst>
+              <a:ext uri="{FF2B5EF4-FFF2-40B4-BE49-F238E27FC236}">
+                <a16:creationId xmlns:a16="http://schemas.microsoft.com/office/drawing/2014/main" id="{0CB0A805-D296-4F61-B7C9-AE5533819570}"/>
+              </a:ext>
+            </a:extLst>
+          </p:cNvPr>
+          <p:cNvSpPr>
+            <a:spLocks noGrp="1"/>
+          </p:cNvSpPr>
+          <p:nvPr>
+            <p:ph idx="1"/>
+          </p:nvPr>
+        </p:nvSpPr>
+        <p:spPr/>
+        <p:txBody>
+          <a:bodyPr/>
+          <a:lstStyle/>
+          <a:p>
+            <a:endParaRPr lang="pl-PL" dirty="0"/>
           </a:p>
         </p:txBody>
       </p:sp>
       <p:pic>
         <p:nvPicPr>
-          <p:cNvPr id="5" name="Symbol zastępczy zawartości 4" descr="Obraz zawierający zrzut ekranu&#10;&#10;Opis wygenerowany automatycznie">
+          <p:cNvPr id="4" name="Obraz 3">
             <a:extLst>
               <a:ext uri="{FF2B5EF4-FFF2-40B4-BE49-F238E27FC236}">
-                <a16:creationId xmlns:a16="http://schemas.microsoft.com/office/drawing/2014/main" id="{775EE8FD-62DB-4BFA-9121-D6120FA4921F}"/>
+                <a16:creationId xmlns:a16="http://schemas.microsoft.com/office/drawing/2014/main" id="{12AD0F31-5ECE-4A46-8C55-D14CB3C22D62}"/>
               </a:ext>
             </a:extLst>
           </p:cNvPr>
-          <p:cNvPicPr>
-            <a:picLocks noGrp="1" noChangeAspect="1"/>
-          </p:cNvPicPr>
-          <p:nvPr>
-            <p:ph idx="1"/>
-          </p:nvPr>
+          <p:cNvPicPr/>
+          <p:nvPr/>
         </p:nvPicPr>
         <p:blipFill>
-          <a:blip r:embed="rId2"/>
+          <a:blip r:embed="rId2">
+            <a:extLst>
+              <a:ext uri="{28A0092B-C50C-407E-A947-70E740481C1C}">
+                <a14:useLocalDpi xmlns:a14="http://schemas.microsoft.com/office/drawing/2010/main" val="0"/>
+              </a:ext>
+            </a:extLst>
+          </a:blip>
+          <a:srcRect/>
           <a:stretch>
             <a:fillRect/>
           </a:stretch>
         </p:blipFill>
-        <p:spPr>
-          <a:xfrm>
-            <a:off x="7009161" y="191780"/>
-            <a:ext cx="5007042" cy="3169014"/>
-          </a:xfrm>
+        <p:spPr bwMode="auto">
+          <a:xfrm>
+            <a:off x="2003030" y="2011187"/>
+            <a:ext cx="8185939" cy="4608273"/>
+          </a:xfrm>
+          <a:prstGeom prst="rect">
+            <a:avLst/>
+          </a:prstGeom>
+          <a:noFill/>
+          <a:ln>
+            <a:noFill/>
+          </a:ln>
         </p:spPr>
       </p:pic>
-      <p:pic>
-        <p:nvPicPr>
-          <p:cNvPr id="7" name="Obraz 6" descr="Obraz zawierający zrzut ekranu, monitor, telefon, ekran&#10;&#10;Opis wygenerowany automatycznie">
+      <p:sp>
+        <p:nvSpPr>
+          <p:cNvPr id="5" name="pole tekstowe 4">
             <a:extLst>
               <a:ext uri="{FF2B5EF4-FFF2-40B4-BE49-F238E27FC236}">
-                <a16:creationId xmlns:a16="http://schemas.microsoft.com/office/drawing/2014/main" id="{8FAEA2A5-D556-4CB1-B340-48B4710A4255}"/>
+                <a16:creationId xmlns:a16="http://schemas.microsoft.com/office/drawing/2014/main" id="{B889F738-911D-47EA-8BAD-86682B2E93A1}"/>
               </a:ext>
             </a:extLst>
           </p:cNvPr>
-          <p:cNvPicPr>
-            <a:picLocks noChangeAspect="1"/>
-          </p:cNvPicPr>
+          <p:cNvSpPr txBox="1"/>
           <p:nvPr/>
-        </p:nvPicPr>
-        <p:blipFill>
-          <a:blip r:embed="rId3"/>
-          <a:stretch>
-            <a:fillRect/>
-          </a:stretch>
-        </p:blipFill>
-        <p:spPr>
-          <a:xfrm>
-            <a:off x="5895273" y="3922242"/>
-            <a:ext cx="4835010" cy="2716298"/>
-          </a:xfrm>
-          <a:prstGeom prst="rect">
-            <a:avLst/>
-          </a:prstGeom>
-        </p:spPr>
-      </p:pic>
-      <p:pic>
-        <p:nvPicPr>
-          <p:cNvPr id="6" name="Symbol zastępczy zawartości 4" descr="Obraz zawierający zrzut ekranu, telefon&#10;&#10;Opis wygenerowany automatycznie">
-            <a:extLst>
-              <a:ext uri="{FF2B5EF4-FFF2-40B4-BE49-F238E27FC236}">
-                <a16:creationId xmlns:a16="http://schemas.microsoft.com/office/drawing/2014/main" id="{B4DD47A8-7F73-4EA3-9E7C-C7D3BB1A67A6}"/>
-              </a:ext>
-            </a:extLst>
-          </p:cNvPr>
-          <p:cNvPicPr>
-            <a:picLocks noChangeAspect="1"/>
-          </p:cNvPicPr>
-          <p:nvPr/>
-        </p:nvPicPr>
-        <p:blipFill>
-          <a:blip r:embed="rId4"/>
-          <a:stretch>
-            <a:fillRect/>
-          </a:stretch>
-        </p:blipFill>
-        <p:spPr>
-          <a:xfrm>
-            <a:off x="652241" y="2148753"/>
-            <a:ext cx="4835010" cy="3036113"/>
-          </a:xfrm>
-          <a:prstGeom prst="rect">
-            <a:avLst/>
-          </a:prstGeom>
-        </p:spPr>
-      </p:pic>
+        </p:nvSpPr>
+        <p:spPr>
+          <a:xfrm>
+            <a:off x="11455601" y="6488668"/>
+            <a:ext cx="771787" cy="369332"/>
+          </a:xfrm>
+          <a:prstGeom prst="rect">
+            <a:avLst/>
+          </a:prstGeom>
+          <a:noFill/>
+        </p:spPr>
+        <p:txBody>
+          <a:bodyPr wrap="square" rtlCol="0">
+            <a:spAutoFit/>
+          </a:bodyPr>
+          <a:lstStyle/>
+          <a:p>
+            <a:r>
+              <a:rPr lang="pl-PL" dirty="0"/>
+              <a:t>4/16</a:t>
+            </a:r>
+          </a:p>
+        </p:txBody>
+      </p:sp>
     </p:spTree>
     <p:extLst>
       <p:ext uri="{BB962C8B-B14F-4D97-AF65-F5344CB8AC3E}">
-        <p14:creationId xmlns:p14="http://schemas.microsoft.com/office/powerpoint/2010/main" val="2753908767"/>
+        <p14:creationId xmlns:p14="http://schemas.microsoft.com/office/powerpoint/2010/main" val="3669393364"/>
       </p:ext>
     </p:extLst>
   </p:cSld>
@@ -10679,7 +11670,7 @@
           <p:cNvPr id="2" name="Tytuł 1">
             <a:extLst>
               <a:ext uri="{FF2B5EF4-FFF2-40B4-BE49-F238E27FC236}">
-                <a16:creationId xmlns:a16="http://schemas.microsoft.com/office/drawing/2014/main" id="{274E6FB1-798D-4982-9AB0-9CF816854144}"/>
+                <a16:creationId xmlns:a16="http://schemas.microsoft.com/office/drawing/2014/main" id="{F5F4C84B-0955-4630-8756-24C6D0CDE4F4}"/>
               </a:ext>
             </a:extLst>
           </p:cNvPr>
@@ -10697,17 +11688,17 @@
           <a:p>
             <a:r>
               <a:rPr lang="pl-PL" dirty="0"/>
-              <a:t>Aplikacja Desktopowa - interfejs</a:t>
+              <a:t>Wybrane środowiska</a:t>
             </a:r>
           </a:p>
         </p:txBody>
       </p:sp>
       <p:pic>
         <p:nvPicPr>
-          <p:cNvPr id="5" name="Symbol zastępczy zawartości 4" descr="Obraz zawierający zrzut ekranu, monitor, ekran, komputer&#10;&#10;Opis wygenerowany automatycznie">
+          <p:cNvPr id="5" name="Symbol zastępczy zawartości 4" descr="Obraz zawierający zrzut ekranu&#10;&#10;Opis wygenerowany automatycznie">
             <a:extLst>
               <a:ext uri="{FF2B5EF4-FFF2-40B4-BE49-F238E27FC236}">
-                <a16:creationId xmlns:a16="http://schemas.microsoft.com/office/drawing/2014/main" id="{316519A3-A569-472A-9E65-0DEF9D67F822}"/>
+                <a16:creationId xmlns:a16="http://schemas.microsoft.com/office/drawing/2014/main" id="{775EE8FD-62DB-4BFA-9121-D6120FA4921F}"/>
               </a:ext>
             </a:extLst>
           </p:cNvPr>
@@ -10726,15 +11717,110 @@
         </p:blipFill>
         <p:spPr>
           <a:xfrm>
-            <a:off x="3144259" y="2101898"/>
-            <a:ext cx="5903482" cy="4622333"/>
+            <a:off x="7009161" y="191780"/>
+            <a:ext cx="5007042" cy="3169014"/>
           </a:xfrm>
         </p:spPr>
       </p:pic>
+      <p:pic>
+        <p:nvPicPr>
+          <p:cNvPr id="7" name="Obraz 6" descr="Obraz zawierający zrzut ekranu, monitor, telefon, ekran&#10;&#10;Opis wygenerowany automatycznie">
+            <a:extLst>
+              <a:ext uri="{FF2B5EF4-FFF2-40B4-BE49-F238E27FC236}">
+                <a16:creationId xmlns:a16="http://schemas.microsoft.com/office/drawing/2014/main" id="{8FAEA2A5-D556-4CB1-B340-48B4710A4255}"/>
+              </a:ext>
+            </a:extLst>
+          </p:cNvPr>
+          <p:cNvPicPr>
+            <a:picLocks noChangeAspect="1"/>
+          </p:cNvPicPr>
+          <p:nvPr/>
+        </p:nvPicPr>
+        <p:blipFill>
+          <a:blip r:embed="rId3"/>
+          <a:stretch>
+            <a:fillRect/>
+          </a:stretch>
+        </p:blipFill>
+        <p:spPr>
+          <a:xfrm>
+            <a:off x="5895273" y="3922242"/>
+            <a:ext cx="4835010" cy="2716298"/>
+          </a:xfrm>
+          <a:prstGeom prst="rect">
+            <a:avLst/>
+          </a:prstGeom>
+        </p:spPr>
+      </p:pic>
+      <p:pic>
+        <p:nvPicPr>
+          <p:cNvPr id="6" name="Symbol zastępczy zawartości 4" descr="Obraz zawierający zrzut ekranu, telefon&#10;&#10;Opis wygenerowany automatycznie">
+            <a:extLst>
+              <a:ext uri="{FF2B5EF4-FFF2-40B4-BE49-F238E27FC236}">
+                <a16:creationId xmlns:a16="http://schemas.microsoft.com/office/drawing/2014/main" id="{B4DD47A8-7F73-4EA3-9E7C-C7D3BB1A67A6}"/>
+              </a:ext>
+            </a:extLst>
+          </p:cNvPr>
+          <p:cNvPicPr>
+            <a:picLocks noChangeAspect="1"/>
+          </p:cNvPicPr>
+          <p:nvPr/>
+        </p:nvPicPr>
+        <p:blipFill>
+          <a:blip r:embed="rId4"/>
+          <a:stretch>
+            <a:fillRect/>
+          </a:stretch>
+        </p:blipFill>
+        <p:spPr>
+          <a:xfrm>
+            <a:off x="652241" y="2148753"/>
+            <a:ext cx="4835010" cy="3036113"/>
+          </a:xfrm>
+          <a:prstGeom prst="rect">
+            <a:avLst/>
+          </a:prstGeom>
+        </p:spPr>
+      </p:pic>
+      <p:sp>
+        <p:nvSpPr>
+          <p:cNvPr id="8" name="pole tekstowe 7">
+            <a:extLst>
+              <a:ext uri="{FF2B5EF4-FFF2-40B4-BE49-F238E27FC236}">
+                <a16:creationId xmlns:a16="http://schemas.microsoft.com/office/drawing/2014/main" id="{59F6A66F-E5F2-4BB0-B9D9-04E0D345E8FA}"/>
+              </a:ext>
+            </a:extLst>
+          </p:cNvPr>
+          <p:cNvSpPr txBox="1"/>
+          <p:nvPr/>
+        </p:nvSpPr>
+        <p:spPr>
+          <a:xfrm>
+            <a:off x="11455601" y="6488668"/>
+            <a:ext cx="771787" cy="369332"/>
+          </a:xfrm>
+          <a:prstGeom prst="rect">
+            <a:avLst/>
+          </a:prstGeom>
+          <a:noFill/>
+        </p:spPr>
+        <p:txBody>
+          <a:bodyPr wrap="square" rtlCol="0">
+            <a:spAutoFit/>
+          </a:bodyPr>
+          <a:lstStyle/>
+          <a:p>
+            <a:r>
+              <a:rPr lang="pl-PL" dirty="0"/>
+              <a:t>5/16</a:t>
+            </a:r>
+          </a:p>
+        </p:txBody>
+      </p:sp>
     </p:spTree>
     <p:extLst>
       <p:ext uri="{BB962C8B-B14F-4D97-AF65-F5344CB8AC3E}">
-        <p14:creationId xmlns:p14="http://schemas.microsoft.com/office/powerpoint/2010/main" val="3513395958"/>
+        <p14:creationId xmlns:p14="http://schemas.microsoft.com/office/powerpoint/2010/main" val="2753908767"/>
       </p:ext>
     </p:extLst>
   </p:cSld>
@@ -10766,7 +11852,7 @@
           <p:cNvPr id="2" name="Tytuł 1">
             <a:extLst>
               <a:ext uri="{FF2B5EF4-FFF2-40B4-BE49-F238E27FC236}">
-                <a16:creationId xmlns:a16="http://schemas.microsoft.com/office/drawing/2014/main" id="{BEDD8F44-CCB0-432F-87EE-93253D84AB5B}"/>
+                <a16:creationId xmlns:a16="http://schemas.microsoft.com/office/drawing/2014/main" id="{274E6FB1-798D-4982-9AB0-9CF816854144}"/>
               </a:ext>
             </a:extLst>
           </p:cNvPr>
@@ -10784,17 +11870,17 @@
           <a:p>
             <a:r>
               <a:rPr lang="pl-PL" dirty="0"/>
-              <a:t>Aplikacja Desktopowa - funkcjonalność</a:t>
+              <a:t>Aplikacja Desktopowa - interfejs</a:t>
             </a:r>
           </a:p>
         </p:txBody>
       </p:sp>
       <p:pic>
         <p:nvPicPr>
-          <p:cNvPr id="5" name="Symbol zastępczy zawartości 4" descr="Obraz zawierający zrzut ekranu, monitor&#10;&#10;Opis wygenerowany automatycznie">
+          <p:cNvPr id="5" name="Symbol zastępczy zawartości 4" descr="Obraz zawierający zrzut ekranu, monitor, ekran, komputer&#10;&#10;Opis wygenerowany automatycznie">
             <a:extLst>
               <a:ext uri="{FF2B5EF4-FFF2-40B4-BE49-F238E27FC236}">
-                <a16:creationId xmlns:a16="http://schemas.microsoft.com/office/drawing/2014/main" id="{8F676CA9-40AC-49D9-B4B4-D59F4FE6E421}"/>
+                <a16:creationId xmlns:a16="http://schemas.microsoft.com/office/drawing/2014/main" id="{316519A3-A569-472A-9E65-0DEF9D67F822}"/>
               </a:ext>
             </a:extLst>
           </p:cNvPr>
@@ -10813,15 +11899,50 @@
         </p:blipFill>
         <p:spPr>
           <a:xfrm>
-            <a:off x="3180766" y="2078383"/>
-            <a:ext cx="5830467" cy="4593919"/>
+            <a:off x="3144259" y="2101898"/>
+            <a:ext cx="5903482" cy="4622333"/>
           </a:xfrm>
         </p:spPr>
       </p:pic>
+      <p:sp>
+        <p:nvSpPr>
+          <p:cNvPr id="4" name="pole tekstowe 3">
+            <a:extLst>
+              <a:ext uri="{FF2B5EF4-FFF2-40B4-BE49-F238E27FC236}">
+                <a16:creationId xmlns:a16="http://schemas.microsoft.com/office/drawing/2014/main" id="{44E69113-E3AC-4406-ACC8-E0165BB6AB05}"/>
+              </a:ext>
+            </a:extLst>
+          </p:cNvPr>
+          <p:cNvSpPr txBox="1"/>
+          <p:nvPr/>
+        </p:nvSpPr>
+        <p:spPr>
+          <a:xfrm>
+            <a:off x="11455601" y="6488668"/>
+            <a:ext cx="771787" cy="369332"/>
+          </a:xfrm>
+          <a:prstGeom prst="rect">
+            <a:avLst/>
+          </a:prstGeom>
+          <a:noFill/>
+        </p:spPr>
+        <p:txBody>
+          <a:bodyPr wrap="square" rtlCol="0">
+            <a:spAutoFit/>
+          </a:bodyPr>
+          <a:lstStyle/>
+          <a:p>
+            <a:r>
+              <a:rPr lang="pl-PL" dirty="0"/>
+              <a:t>6/16</a:t>
+            </a:r>
+          </a:p>
+        </p:txBody>
+      </p:sp>
     </p:spTree>
     <p:extLst>
       <p:ext uri="{BB962C8B-B14F-4D97-AF65-F5344CB8AC3E}">
-        <p14:creationId xmlns:p14="http://schemas.microsoft.com/office/powerpoint/2010/main" val="2889066787"/>
+        <p14:creationId xmlns:p14="http://schemas.microsoft.com/office/powerpoint/2010/main" val="3513395958"/>
       </p:ext>
     </p:extLst>
   </p:cSld>
@@ -10853,7 +11974,7 @@
           <p:cNvPr id="2" name="Tytuł 1">
             <a:extLst>
               <a:ext uri="{FF2B5EF4-FFF2-40B4-BE49-F238E27FC236}">
-                <a16:creationId xmlns:a16="http://schemas.microsoft.com/office/drawing/2014/main" id="{4044DB64-5DCF-4FAF-BE97-BC43917EF627}"/>
+                <a16:creationId xmlns:a16="http://schemas.microsoft.com/office/drawing/2014/main" id="{BEDD8F44-CCB0-432F-87EE-93253D84AB5B}"/>
               </a:ext>
             </a:extLst>
           </p:cNvPr>
@@ -10878,10 +11999,10 @@
       </p:sp>
       <p:pic>
         <p:nvPicPr>
-          <p:cNvPr id="5" name="Symbol zastępczy zawartości 4" descr="Obraz zawierający zrzut ekranu, monitor, ekran, czarny&#10;&#10;Opis wygenerowany automatycznie">
+          <p:cNvPr id="5" name="Symbol zastępczy zawartości 4" descr="Obraz zawierający zrzut ekranu, monitor&#10;&#10;Opis wygenerowany automatycznie">
             <a:extLst>
               <a:ext uri="{FF2B5EF4-FFF2-40B4-BE49-F238E27FC236}">
-                <a16:creationId xmlns:a16="http://schemas.microsoft.com/office/drawing/2014/main" id="{26BBCBF4-D489-4E54-AACD-1123262942AA}"/>
+                <a16:creationId xmlns:a16="http://schemas.microsoft.com/office/drawing/2014/main" id="{8F676CA9-40AC-49D9-B4B4-D59F4FE6E421}"/>
               </a:ext>
             </a:extLst>
           </p:cNvPr>
@@ -10900,15 +12021,50 @@
         </p:blipFill>
         <p:spPr>
           <a:xfrm>
-            <a:off x="3138611" y="2088322"/>
-            <a:ext cx="5914777" cy="4660348"/>
+            <a:off x="3180766" y="2078383"/>
+            <a:ext cx="5830467" cy="4593919"/>
           </a:xfrm>
         </p:spPr>
       </p:pic>
+      <p:sp>
+        <p:nvSpPr>
+          <p:cNvPr id="4" name="pole tekstowe 3">
+            <a:extLst>
+              <a:ext uri="{FF2B5EF4-FFF2-40B4-BE49-F238E27FC236}">
+                <a16:creationId xmlns:a16="http://schemas.microsoft.com/office/drawing/2014/main" id="{7A6D0785-A8DC-4A63-A096-4BBB42CC02D8}"/>
+              </a:ext>
+            </a:extLst>
+          </p:cNvPr>
+          <p:cNvSpPr txBox="1"/>
+          <p:nvPr/>
+        </p:nvSpPr>
+        <p:spPr>
+          <a:xfrm>
+            <a:off x="11455601" y="6488668"/>
+            <a:ext cx="771787" cy="369332"/>
+          </a:xfrm>
+          <a:prstGeom prst="rect">
+            <a:avLst/>
+          </a:prstGeom>
+          <a:noFill/>
+        </p:spPr>
+        <p:txBody>
+          <a:bodyPr wrap="square" rtlCol="0">
+            <a:spAutoFit/>
+          </a:bodyPr>
+          <a:lstStyle/>
+          <a:p>
+            <a:r>
+              <a:rPr lang="pl-PL" b="1" dirty="0"/>
+              <a:t>7/16</a:t>
+            </a:r>
+          </a:p>
+        </p:txBody>
+      </p:sp>
     </p:spTree>
     <p:extLst>
       <p:ext uri="{BB962C8B-B14F-4D97-AF65-F5344CB8AC3E}">
-        <p14:creationId xmlns:p14="http://schemas.microsoft.com/office/powerpoint/2010/main" val="1208801786"/>
+        <p14:creationId xmlns:p14="http://schemas.microsoft.com/office/powerpoint/2010/main" val="2889066787"/>
       </p:ext>
     </p:extLst>
   </p:cSld>
@@ -10940,7 +12096,7 @@
           <p:cNvPr id="2" name="Tytuł 1">
             <a:extLst>
               <a:ext uri="{FF2B5EF4-FFF2-40B4-BE49-F238E27FC236}">
-                <a16:creationId xmlns:a16="http://schemas.microsoft.com/office/drawing/2014/main" id="{FBD8E08C-CF7D-4B8E-8349-2660E8C01DB0}"/>
+                <a16:creationId xmlns:a16="http://schemas.microsoft.com/office/drawing/2014/main" id="{4044DB64-5DCF-4FAF-BE97-BC43917EF627}"/>
               </a:ext>
             </a:extLst>
           </p:cNvPr>
@@ -10958,17 +12114,17 @@
           <a:p>
             <a:r>
               <a:rPr lang="pl-PL" dirty="0"/>
-              <a:t>Aplikacja Desktopowa – tryb administratora</a:t>
+              <a:t>Aplikacja Desktopowa - funkcjonalność</a:t>
             </a:r>
           </a:p>
         </p:txBody>
       </p:sp>
       <p:pic>
         <p:nvPicPr>
-          <p:cNvPr id="5" name="Symbol zastępczy zawartości 4" descr="Obraz zawierający zrzut ekranu, monitor, ekran, komputer&#10;&#10;Opis wygenerowany automatycznie">
+          <p:cNvPr id="5" name="Symbol zastępczy zawartości 4" descr="Obraz zawierający zrzut ekranu, monitor, ekran, czarny&#10;&#10;Opis wygenerowany automatycznie">
             <a:extLst>
               <a:ext uri="{FF2B5EF4-FFF2-40B4-BE49-F238E27FC236}">
-                <a16:creationId xmlns:a16="http://schemas.microsoft.com/office/drawing/2014/main" id="{7C86CF07-65A4-4FEF-9C7D-F96CDD598402}"/>
+                <a16:creationId xmlns:a16="http://schemas.microsoft.com/office/drawing/2014/main" id="{26BBCBF4-D489-4E54-AACD-1123262942AA}"/>
               </a:ext>
             </a:extLst>
           </p:cNvPr>
@@ -10987,15 +12143,50 @@
         </p:blipFill>
         <p:spPr>
           <a:xfrm>
-            <a:off x="3056527" y="1988930"/>
-            <a:ext cx="6078946" cy="4789700"/>
+            <a:off x="3138611" y="2088322"/>
+            <a:ext cx="5914777" cy="4660348"/>
           </a:xfrm>
         </p:spPr>
       </p:pic>
+      <p:sp>
+        <p:nvSpPr>
+          <p:cNvPr id="4" name="pole tekstowe 3">
+            <a:extLst>
+              <a:ext uri="{FF2B5EF4-FFF2-40B4-BE49-F238E27FC236}">
+                <a16:creationId xmlns:a16="http://schemas.microsoft.com/office/drawing/2014/main" id="{A328C310-A6B5-457F-8082-1694DA66FDE3}"/>
+              </a:ext>
+            </a:extLst>
+          </p:cNvPr>
+          <p:cNvSpPr txBox="1"/>
+          <p:nvPr/>
+        </p:nvSpPr>
+        <p:spPr>
+          <a:xfrm>
+            <a:off x="11455601" y="6488668"/>
+            <a:ext cx="771787" cy="369332"/>
+          </a:xfrm>
+          <a:prstGeom prst="rect">
+            <a:avLst/>
+          </a:prstGeom>
+          <a:noFill/>
+        </p:spPr>
+        <p:txBody>
+          <a:bodyPr wrap="square" rtlCol="0">
+            <a:spAutoFit/>
+          </a:bodyPr>
+          <a:lstStyle/>
+          <a:p>
+            <a:r>
+              <a:rPr lang="pl-PL" dirty="0"/>
+              <a:t>8/16</a:t>
+            </a:r>
+          </a:p>
+        </p:txBody>
+      </p:sp>
     </p:spTree>
     <p:extLst>
       <p:ext uri="{BB962C8B-B14F-4D97-AF65-F5344CB8AC3E}">
-        <p14:creationId xmlns:p14="http://schemas.microsoft.com/office/powerpoint/2010/main" val="5326048"/>
+        <p14:creationId xmlns:p14="http://schemas.microsoft.com/office/powerpoint/2010/main" val="1208801786"/>
       </p:ext>
     </p:extLst>
   </p:cSld>
@@ -11008,41 +12199,6 @@
 <file path=ppt/slides/slide9.xml><?xml version="1.0" encoding="utf-8"?>
 <p:sld xmlns:a="http://schemas.openxmlformats.org/drawingml/2006/main" xmlns:r="http://schemas.openxmlformats.org/officeDocument/2006/relationships" xmlns:p="http://schemas.openxmlformats.org/presentationml/2006/main">
   <p:cSld>
-    <p:bg>
-      <p:bgPr>
-        <a:gradFill rotWithShape="1">
-          <a:gsLst>
-            <a:gs pos="0">
-              <a:schemeClr val="bg2">
-                <a:tint val="96000"/>
-                <a:shade val="100000"/>
-                <a:hueMod val="270000"/>
-                <a:satMod val="200000"/>
-                <a:lumMod val="128000"/>
-              </a:schemeClr>
-            </a:gs>
-            <a:gs pos="50000">
-              <a:schemeClr val="bg2">
-                <a:shade val="100000"/>
-                <a:hueMod val="100000"/>
-                <a:satMod val="110000"/>
-                <a:lumMod val="130000"/>
-              </a:schemeClr>
-            </a:gs>
-            <a:gs pos="100000">
-              <a:schemeClr val="bg2">
-                <a:shade val="78000"/>
-                <a:hueMod val="44000"/>
-                <a:satMod val="200000"/>
-                <a:lumMod val="69000"/>
-              </a:schemeClr>
-            </a:gs>
-          </a:gsLst>
-          <a:lin ang="2520000" scaled="0"/>
-        </a:gradFill>
-        <a:effectLst/>
-      </p:bgPr>
-    </p:bg>
     <p:spTree>
       <p:nvGrpSpPr>
         <p:cNvPr id="1" name=""/>
@@ -11057,348 +12213,102 @@
           <a:chExt cx="0" cy="0"/>
         </a:xfrm>
       </p:grpSpPr>
-      <p:sp useBgFill="1">
-        <p:nvSpPr>
-          <p:cNvPr id="8" name="Rectangle 7">
+      <p:sp>
+        <p:nvSpPr>
+          <p:cNvPr id="2" name="Tytuł 1">
             <a:extLst>
               <a:ext uri="{FF2B5EF4-FFF2-40B4-BE49-F238E27FC236}">
-                <a16:creationId xmlns:a16="http://schemas.microsoft.com/office/drawing/2014/main" id="{4B0FA309-807F-4C17-98EF-A3BA7388E213}"/>
-              </a:ext>
-              <a:ext uri="{C183D7F6-B498-43B3-948B-1728B52AA6E4}">
-                <adec:decorative xmlns:adec="http://schemas.microsoft.com/office/drawing/2017/decorative" val="1"/>
+                <a16:creationId xmlns:a16="http://schemas.microsoft.com/office/drawing/2014/main" id="{FBD8E08C-CF7D-4B8E-8349-2660E8C01DB0}"/>
               </a:ext>
             </a:extLst>
           </p:cNvPr>
           <p:cNvSpPr>
-            <a:spLocks noGrp="1" noRot="1" noChangeAspect="1" noMove="1" noResize="1" noEditPoints="1" noAdjustHandles="1" noChangeArrowheads="1" noChangeShapeType="1" noTextEdit="1"/>
-          </p:cNvSpPr>
-          <p:nvPr>
-            <p:extLst>
-              <p:ext uri="{386F3935-93C4-4BCD-93E2-E3B085C9AB24}">
-                <p16:designElem xmlns:p16="http://schemas.microsoft.com/office/powerpoint/2015/main" val="1"/>
-              </p:ext>
-            </p:extLst>
-          </p:nvPr>
-        </p:nvSpPr>
-        <p:spPr>
-          <a:xfrm>
-            <a:off x="0" y="0"/>
-            <a:ext cx="12188824" cy="6858000"/>
-          </a:xfrm>
-          <a:prstGeom prst="rect">
-            <a:avLst/>
-          </a:prstGeom>
-          <a:ln>
-            <a:noFill/>
-          </a:ln>
-        </p:spPr>
-        <p:style>
-          <a:lnRef idx="2">
-            <a:schemeClr val="accent1">
-              <a:shade val="50000"/>
-            </a:schemeClr>
-          </a:lnRef>
-          <a:fillRef idx="1">
-            <a:schemeClr val="accent1"/>
-          </a:fillRef>
-          <a:effectRef idx="0">
-            <a:schemeClr val="accent1"/>
-          </a:effectRef>
-          <a:fontRef idx="minor">
-            <a:schemeClr val="lt1"/>
-          </a:fontRef>
-        </p:style>
-        <p:txBody>
-          <a:bodyPr rtlCol="0" anchor="ctr"/>
+            <a:spLocks noGrp="1"/>
+          </p:cNvSpPr>
+          <p:nvPr>
+            <p:ph type="title"/>
+          </p:nvPr>
+        </p:nvSpPr>
+        <p:spPr/>
+        <p:txBody>
+          <a:bodyPr/>
           <a:lstStyle/>
           <a:p>
-            <a:pPr algn="ctr"/>
-            <a:endParaRPr lang="en-US"/>
+            <a:r>
+              <a:rPr lang="pl-PL" dirty="0"/>
+              <a:t>Aplikacja Desktopowa – tryb administratora</a:t>
+            </a:r>
           </a:p>
         </p:txBody>
       </p:sp>
       <p:pic>
         <p:nvPicPr>
-          <p:cNvPr id="10" name="Picture 9">
+          <p:cNvPr id="5" name="Symbol zastępczy zawartości 4" descr="Obraz zawierający zrzut ekranu, monitor, ekran, komputer&#10;&#10;Opis wygenerowany automatycznie">
             <a:extLst>
               <a:ext uri="{FF2B5EF4-FFF2-40B4-BE49-F238E27FC236}">
-                <a16:creationId xmlns:a16="http://schemas.microsoft.com/office/drawing/2014/main" id="{2642A87B-CAE9-4F8F-B293-28388E45D9EE}"/>
-              </a:ext>
-              <a:ext uri="{C183D7F6-B498-43B3-948B-1728B52AA6E4}">
-                <adec:decorative xmlns:adec="http://schemas.microsoft.com/office/drawing/2017/decorative" val="1"/>
+                <a16:creationId xmlns:a16="http://schemas.microsoft.com/office/drawing/2014/main" id="{7C86CF07-65A4-4FEF-9C7D-F96CDD598402}"/>
               </a:ext>
             </a:extLst>
           </p:cNvPr>
           <p:cNvPicPr>
-            <a:picLocks noGrp="1" noRot="1" noChangeAspect="1" noMove="1" noResize="1" noEditPoints="1" noAdjustHandles="1" noChangeArrowheads="1" noChangeShapeType="1" noCrop="1"/>
+            <a:picLocks noGrp="1" noChangeAspect="1"/>
           </p:cNvPicPr>
           <p:nvPr>
-            <p:extLst>
-              <p:ext uri="{386F3935-93C4-4BCD-93E2-E3B085C9AB24}">
-                <p16:designElem xmlns:p16="http://schemas.microsoft.com/office/powerpoint/2015/main" val="1"/>
-              </p:ext>
-            </p:extLst>
+            <p:ph idx="1"/>
           </p:nvPr>
         </p:nvPicPr>
         <p:blipFill>
-          <a:blip r:embed="rId2">
-            <a:alphaModFix amt="10000"/>
-            <a:extLst>
-              <a:ext uri="{28A0092B-C50C-407E-A947-70E740481C1C}">
-                <a14:useLocalDpi xmlns:a14="http://schemas.microsoft.com/office/drawing/2010/main" val="0"/>
-              </a:ext>
-            </a:extLst>
-          </a:blip>
+          <a:blip r:embed="rId2"/>
           <a:stretch>
             <a:fillRect/>
           </a:stretch>
         </p:blipFill>
         <p:spPr>
           <a:xfrm>
-            <a:off x="0" y="0"/>
-            <a:ext cx="12192000" cy="6858000"/>
-          </a:xfrm>
-          <a:prstGeom prst="rect">
-            <a:avLst/>
-          </a:prstGeom>
+            <a:off x="3056527" y="1988930"/>
+            <a:ext cx="6078946" cy="4789700"/>
+          </a:xfrm>
         </p:spPr>
       </p:pic>
       <p:sp>
         <p:nvSpPr>
-          <p:cNvPr id="12" name="Rectangle 11">
+          <p:cNvPr id="4" name="pole tekstowe 3">
             <a:extLst>
               <a:ext uri="{FF2B5EF4-FFF2-40B4-BE49-F238E27FC236}">
-                <a16:creationId xmlns:a16="http://schemas.microsoft.com/office/drawing/2014/main" id="{C8FA1749-B91A-40E7-AD01-0B9C9C6AF74E}"/>
-              </a:ext>
-              <a:ext uri="{C183D7F6-B498-43B3-948B-1728B52AA6E4}">
-                <adec:decorative xmlns:adec="http://schemas.microsoft.com/office/drawing/2017/decorative" val="1"/>
+                <a16:creationId xmlns:a16="http://schemas.microsoft.com/office/drawing/2014/main" id="{32E3AAE0-0BE2-48D1-BA26-BD20FF7AD593}"/>
               </a:ext>
             </a:extLst>
           </p:cNvPr>
-          <p:cNvSpPr>
-            <a:spLocks noGrp="1" noRot="1" noChangeAspect="1" noMove="1" noResize="1" noEditPoints="1" noAdjustHandles="1" noChangeArrowheads="1" noChangeShapeType="1" noTextEdit="1"/>
-          </p:cNvSpPr>
-          <p:nvPr>
-            <p:extLst>
-              <p:ext uri="{386F3935-93C4-4BCD-93E2-E3B085C9AB24}">
-                <p16:designElem xmlns:p16="http://schemas.microsoft.com/office/powerpoint/2015/main" val="1"/>
-              </p:ext>
-            </p:extLst>
-          </p:nvPr>
-        </p:nvSpPr>
-        <p:spPr>
-          <a:xfrm>
-            <a:off x="4644527" y="0"/>
-            <a:ext cx="7552944" cy="6858001"/>
-          </a:xfrm>
-          <a:prstGeom prst="rect">
-            <a:avLst/>
-          </a:prstGeom>
-          <a:solidFill>
-            <a:schemeClr val="accent1"/>
-          </a:solidFill>
-          <a:ln>
-            <a:noFill/>
-          </a:ln>
-        </p:spPr>
-        <p:style>
-          <a:lnRef idx="2">
-            <a:schemeClr val="accent1">
-              <a:shade val="50000"/>
-            </a:schemeClr>
-          </a:lnRef>
-          <a:fillRef idx="1">
-            <a:schemeClr val="accent1"/>
-          </a:fillRef>
-          <a:effectRef idx="0">
-            <a:schemeClr val="accent1"/>
-          </a:effectRef>
-          <a:fontRef idx="minor">
-            <a:schemeClr val="lt1"/>
-          </a:fontRef>
-        </p:style>
-        <p:txBody>
-          <a:bodyPr rtlCol="0" anchor="ctr"/>
-          <a:lstStyle/>
-          <a:p>
-            <a:pPr algn="ctr"/>
-            <a:endParaRPr lang="en-US"/>
-          </a:p>
-        </p:txBody>
-      </p:sp>
-      <p:pic>
-        <p:nvPicPr>
-          <p:cNvPr id="14" name="Picture 13">
-            <a:extLst>
-              <a:ext uri="{FF2B5EF4-FFF2-40B4-BE49-F238E27FC236}">
-                <a16:creationId xmlns:a16="http://schemas.microsoft.com/office/drawing/2014/main" id="{3B7A934F-FFF7-4353-83D3-4EF66E93EEF8}"/>
-              </a:ext>
-              <a:ext uri="{C183D7F6-B498-43B3-948B-1728B52AA6E4}">
-                <adec:decorative xmlns:adec="http://schemas.microsoft.com/office/drawing/2017/decorative" val="1"/>
-              </a:ext>
-            </a:extLst>
-          </p:cNvPr>
-          <p:cNvPicPr>
-            <a:picLocks noGrp="1" noRot="1" noChangeAspect="1" noMove="1" noResize="1" noEditPoints="1" noAdjustHandles="1" noChangeArrowheads="1" noChangeShapeType="1" noCrop="1"/>
-          </p:cNvPicPr>
-          <p:nvPr>
-            <p:extLst>
-              <p:ext uri="{386F3935-93C4-4BCD-93E2-E3B085C9AB24}">
-                <p16:designElem xmlns:p16="http://schemas.microsoft.com/office/powerpoint/2015/main" val="1"/>
-              </p:ext>
-            </p:extLst>
-          </p:nvPr>
-        </p:nvPicPr>
-        <p:blipFill>
-          <a:blip r:embed="rId3" cstate="print">
-            <a:extLst>
-              <a:ext uri="{28A0092B-C50C-407E-A947-70E740481C1C}">
-                <a14:useLocalDpi xmlns:a14="http://schemas.microsoft.com/office/drawing/2010/main" val="0"/>
-              </a:ext>
-            </a:extLst>
-          </a:blip>
-          <a:stretch>
-            <a:fillRect/>
-          </a:stretch>
-        </p:blipFill>
-        <p:spPr>
-          <a:xfrm>
-            <a:off x="1" y="5006045"/>
-            <a:ext cx="4965192" cy="144668"/>
-          </a:xfrm>
-          <a:prstGeom prst="rect">
-            <a:avLst/>
-          </a:prstGeom>
-        </p:spPr>
-      </p:pic>
-      <p:sp>
-        <p:nvSpPr>
-          <p:cNvPr id="16" name="Rectangle 15">
-            <a:extLst>
-              <a:ext uri="{FF2B5EF4-FFF2-40B4-BE49-F238E27FC236}">
-                <a16:creationId xmlns:a16="http://schemas.microsoft.com/office/drawing/2014/main" id="{700676C8-6DE8-47DD-9A23-D42063A12E10}"/>
-              </a:ext>
-              <a:ext uri="{C183D7F6-B498-43B3-948B-1728B52AA6E4}">
-                <adec:decorative xmlns:adec="http://schemas.microsoft.com/office/drawing/2017/decorative" val="1"/>
-              </a:ext>
-            </a:extLst>
-          </p:cNvPr>
-          <p:cNvSpPr>
-            <a:spLocks noGrp="1" noRot="1" noChangeAspect="1" noMove="1" noResize="1" noEditPoints="1" noAdjustHandles="1" noChangeArrowheads="1" noChangeShapeType="1" noTextEdit="1"/>
-          </p:cNvSpPr>
-          <p:nvPr>
-            <p:extLst>
-              <p:ext uri="{386F3935-93C4-4BCD-93E2-E3B085C9AB24}">
-                <p16:designElem xmlns:p16="http://schemas.microsoft.com/office/powerpoint/2015/main" val="1"/>
-              </p:ext>
-            </p:extLst>
-          </p:nvPr>
-        </p:nvSpPr>
-        <p:spPr>
-          <a:xfrm>
-            <a:off x="-1" y="1838764"/>
-            <a:ext cx="4964567" cy="3180473"/>
-          </a:xfrm>
-          <a:prstGeom prst="rect">
-            <a:avLst/>
-          </a:prstGeom>
-          <a:solidFill>
-            <a:srgbClr val="262626"/>
-          </a:solidFill>
-          <a:ln>
-            <a:noFill/>
-          </a:ln>
-        </p:spPr>
-        <p:style>
-          <a:lnRef idx="2">
-            <a:schemeClr val="accent1">
-              <a:shade val="50000"/>
-            </a:schemeClr>
-          </a:lnRef>
-          <a:fillRef idx="1">
-            <a:schemeClr val="accent1"/>
-          </a:fillRef>
-          <a:effectRef idx="0">
-            <a:schemeClr val="accent1"/>
-          </a:effectRef>
-          <a:fontRef idx="minor">
-            <a:schemeClr val="lt1"/>
-          </a:fontRef>
-        </p:style>
-      </p:sp>
-      <p:sp>
-        <p:nvSpPr>
-          <p:cNvPr id="2" name="Tytuł 1">
-            <a:extLst>
-              <a:ext uri="{FF2B5EF4-FFF2-40B4-BE49-F238E27FC236}">
-                <a16:creationId xmlns:a16="http://schemas.microsoft.com/office/drawing/2014/main" id="{2294BD86-C7CC-47E5-9CA5-8D232644AAF8}"/>
-              </a:ext>
-            </a:extLst>
-          </p:cNvPr>
-          <p:cNvSpPr>
-            <a:spLocks noGrp="1"/>
-          </p:cNvSpPr>
-          <p:nvPr>
-            <p:ph type="title"/>
-          </p:nvPr>
-        </p:nvSpPr>
-        <p:spPr>
-          <a:xfrm>
-            <a:off x="680321" y="2063262"/>
-            <a:ext cx="3739279" cy="2661052"/>
-          </a:xfrm>
-        </p:spPr>
-        <p:txBody>
-          <a:bodyPr>
-            <a:normAutofit/>
+          <p:cNvSpPr txBox="1"/>
+          <p:nvPr/>
+        </p:nvSpPr>
+        <p:spPr>
+          <a:xfrm>
+            <a:off x="11455601" y="6488668"/>
+            <a:ext cx="771787" cy="369332"/>
+          </a:xfrm>
+          <a:prstGeom prst="rect">
+            <a:avLst/>
+          </a:prstGeom>
+          <a:noFill/>
+        </p:spPr>
+        <p:txBody>
+          <a:bodyPr wrap="square" rtlCol="0">
+            <a:spAutoFit/>
           </a:bodyPr>
           <a:lstStyle/>
           <a:p>
-            <a:pPr algn="r"/>
-            <a:r>
-              <a:rPr lang="pl-PL" sz="4400" dirty="0">
-                <a:solidFill>
-                  <a:srgbClr val="FFFFFF"/>
-                </a:solidFill>
-              </a:rPr>
-              <a:t>Aplikacja Android</a:t>
-            </a:r>
-          </a:p>
-        </p:txBody>
-      </p:sp>
-      <p:pic>
-        <p:nvPicPr>
-          <p:cNvPr id="5" name="Symbol zastępczy zawartości 4" descr="Obraz zawierający zrzut ekranu, zegar&#10;&#10;Opis wygenerowany automatycznie">
-            <a:extLst>
-              <a:ext uri="{FF2B5EF4-FFF2-40B4-BE49-F238E27FC236}">
-                <a16:creationId xmlns:a16="http://schemas.microsoft.com/office/drawing/2014/main" id="{1F078DD3-E0CD-4B38-8AD4-A0734B9DCC76}"/>
-              </a:ext>
-            </a:extLst>
-          </p:cNvPr>
-          <p:cNvPicPr>
-            <a:picLocks noGrp="1" noChangeAspect="1"/>
-          </p:cNvPicPr>
-          <p:nvPr>
-            <p:ph idx="1"/>
-          </p:nvPr>
-        </p:nvPicPr>
-        <p:blipFill>
-          <a:blip r:embed="rId4"/>
-          <a:stretch>
-            <a:fillRect/>
-          </a:stretch>
-        </p:blipFill>
-        <p:spPr>
-          <a:xfrm>
-            <a:off x="6838384" y="0"/>
-            <a:ext cx="3165230" cy="6858000"/>
-          </a:xfrm>
-        </p:spPr>
-      </p:pic>
+            <a:r>
+              <a:rPr lang="pl-PL" dirty="0"/>
+              <a:t>9/16</a:t>
+            </a:r>
+          </a:p>
+        </p:txBody>
+      </p:sp>
     </p:spTree>
     <p:extLst>
       <p:ext uri="{BB962C8B-B14F-4D97-AF65-F5344CB8AC3E}">
-        <p14:creationId xmlns:p14="http://schemas.microsoft.com/office/powerpoint/2010/main" val="2795247331"/>
+        <p14:creationId xmlns:p14="http://schemas.microsoft.com/office/powerpoint/2010/main" val="5326048"/>
       </p:ext>
     </p:extLst>
   </p:cSld>

</xml_diff>